<commit_message>
add sequence diagram for delete-medical-history command
</commit_message>
<xml_diff>
--- a/docs/diagrams/AddMedicalHistorySequenceDiagram.pptx
+++ b/docs/diagrams/AddMedicalHistorySequenceDiagram.pptx
@@ -5888,7 +5888,23 @@
                   <a:srgbClr val="7030A0"/>
                 </a:solidFill>
               </a:rPr>
-              <a:t>(p)</a:t>
+              <a:t>(</a:t>
+            </a:r>
+            <a:r>
+              <a:rPr lang="en-US" sz="900" dirty="0" err="1">
+                <a:solidFill>
+                  <a:srgbClr val="7030A0"/>
+                </a:solidFill>
+              </a:rPr>
+              <a:t>p,q</a:t>
+            </a:r>
+            <a:r>
+              <a:rPr lang="en-US" sz="900" dirty="0">
+                <a:solidFill>
+                  <a:srgbClr val="7030A0"/>
+                </a:solidFill>
+              </a:rPr>
+              <a:t>)</a:t>
             </a:r>
           </a:p>
         </p:txBody>

</xml_diff>

<commit_message>
add sequence diagram for filter command
</commit_message>
<xml_diff>
--- a/docs/diagrams/AddMedicalHistorySequenceDiagram.pptx
+++ b/docs/diagrams/AddMedicalHistorySequenceDiagram.pptx
@@ -3886,8 +3886,8 @@
         </p:nvSpPr>
         <p:spPr>
           <a:xfrm>
-            <a:off x="4628203" y="2697038"/>
-            <a:ext cx="856850" cy="519412"/>
+            <a:off x="4628202" y="2731829"/>
+            <a:ext cx="1129245" cy="502700"/>
           </a:xfrm>
           <a:prstGeom prst="rect">
             <a:avLst/>
@@ -3927,7 +3927,7 @@
                   <a:schemeClr val="bg1"/>
                 </a:solidFill>
               </a:rPr>
-              <a:t>d:AddMedicalHistory</a:t>
+              <a:t>d:FilterPatient</a:t>
             </a:r>
             <a:br>
               <a:rPr lang="en-US" sz="1200" dirty="0">
@@ -4124,7 +4124,7 @@
         <p:spPr>
           <a:xfrm>
             <a:off x="-18663" y="2546133"/>
-            <a:ext cx="1028758" cy="415498"/>
+            <a:ext cx="1028758" cy="276999"/>
           </a:xfrm>
           <a:prstGeom prst="rect">
             <a:avLst/>
@@ -4155,42 +4155,7 @@
                   <a:srgbClr val="0070C0"/>
                 </a:solidFill>
               </a:rPr>
-              <a:t>(“add-medical-history</a:t>
-            </a:r>
-          </a:p>
-          <a:p>
-            <a:pPr algn="r"/>
-            <a:r>
-              <a:rPr lang="en-US" altLang="zh-Hans" sz="900" dirty="0">
-                <a:solidFill>
-                  <a:srgbClr val="0070C0"/>
-                </a:solidFill>
-              </a:rPr>
-              <a:t>1</a:t>
-            </a:r>
-            <a:r>
-              <a:rPr lang="zh-Hans" altLang="en-US" sz="900" dirty="0">
-                <a:solidFill>
-                  <a:srgbClr val="0070C0"/>
-                </a:solidFill>
-              </a:rPr>
-              <a:t> </a:t>
-            </a:r>
-            <a:r>
-              <a:rPr lang="en-US" altLang="zh-Hans" sz="900" dirty="0">
-                <a:solidFill>
-                  <a:srgbClr val="0070C0"/>
-                </a:solidFill>
-              </a:rPr>
-              <a:t>al/milk  c/healthy</a:t>
-            </a:r>
-            <a:r>
-              <a:rPr lang="en-US" sz="900" dirty="0">
-                <a:solidFill>
-                  <a:srgbClr val="0070C0"/>
-                </a:solidFill>
-              </a:rPr>
-              <a:t>”)</a:t>
+              <a:t>(“filter-patient”)</a:t>
             </a:r>
           </a:p>
         </p:txBody>
@@ -4402,8 +4367,8 @@
         </p:nvSpPr>
         <p:spPr>
           <a:xfrm>
-            <a:off x="5924175" y="3095802"/>
-            <a:ext cx="802576" cy="238408"/>
+            <a:off x="5853451" y="2857049"/>
+            <a:ext cx="1082085" cy="474476"/>
           </a:xfrm>
           <a:prstGeom prst="rect">
             <a:avLst/>
@@ -4449,7 +4414,7 @@
                   <a:schemeClr val="bg1"/>
                 </a:solidFill>
               </a:rPr>
-              <a:t>q:Patient</a:t>
+              <a:t>p:TagContainsPatientPredicate</a:t>
             </a:r>
             <a:endParaRPr lang="en-SG" sz="1200" dirty="0">
               <a:solidFill>
@@ -4767,14 +4732,14 @@
       </p:cxnSp>
       <p:sp>
         <p:nvSpPr>
-          <p:cNvPr id="79" name="TextBox 78"/>
+          <p:cNvPr id="82" name="TextBox 81"/>
           <p:cNvSpPr txBox="1"/>
           <p:nvPr/>
         </p:nvSpPr>
         <p:spPr>
           <a:xfrm>
-            <a:off x="2051894" y="3287391"/>
-            <a:ext cx="1773145" cy="138499"/>
+            <a:off x="2654692" y="4906798"/>
+            <a:ext cx="621216" cy="153888"/>
           </a:xfrm>
           <a:prstGeom prst="rect">
             <a:avLst/>
@@ -4799,22 +4764,22 @@
           </a:lstStyle>
           <a:p>
             <a:r>
-              <a:rPr lang="en-US" sz="900" dirty="0"/>
-              <a:t>parse(“1 al/milk  c/healthy”)</a:t>
-            </a:r>
-          </a:p>
-        </p:txBody>
-      </p:sp>
-      <p:sp>
-        <p:nvSpPr>
-          <p:cNvPr id="80" name="TextBox 79"/>
+              <a:rPr lang="en-US" sz="1000" dirty="0"/>
+              <a:t>result</a:t>
+            </a:r>
+          </a:p>
+        </p:txBody>
+      </p:sp>
+      <p:sp>
+        <p:nvSpPr>
+          <p:cNvPr id="83" name="TextBox 82"/>
           <p:cNvSpPr txBox="1"/>
           <p:nvPr/>
         </p:nvSpPr>
         <p:spPr>
           <a:xfrm>
-            <a:off x="604258" y="2687772"/>
-            <a:ext cx="1596780" cy="446276"/>
+            <a:off x="-87651" y="5065670"/>
+            <a:ext cx="762000" cy="138499"/>
           </a:xfrm>
           <a:prstGeom prst="rect">
             <a:avLst/>
@@ -4840,49 +4805,106 @@
           <a:p>
             <a:r>
               <a:rPr lang="en-US" sz="900" dirty="0"/>
-              <a:t>parse</a:t>
-            </a:r>
-          </a:p>
-          <a:p>
-            <a:r>
-              <a:rPr lang="en-US" sz="900" dirty="0"/>
-              <a:t>(“</a:t>
-            </a:r>
-            <a:r>
-              <a:rPr lang="en-US" altLang="zh-CN" sz="900" dirty="0"/>
-              <a:t>add-medical-history</a:t>
-            </a:r>
-          </a:p>
-          <a:p>
-            <a:r>
-              <a:rPr lang="en-US" altLang="zh-Hans" sz="900" dirty="0"/>
-              <a:t>1</a:t>
-            </a:r>
-            <a:r>
-              <a:rPr lang="zh-Hans" altLang="en-US" sz="900" dirty="0"/>
-              <a:t> </a:t>
-            </a:r>
-            <a:r>
-              <a:rPr lang="en-US" altLang="zh-Hans" sz="900" dirty="0"/>
-              <a:t>al/milk  c/healthy</a:t>
-            </a:r>
-            <a:r>
-              <a:rPr lang="en-US" sz="1100" dirty="0"/>
-              <a:t>”)</a:t>
-            </a:r>
-          </a:p>
-        </p:txBody>
-      </p:sp>
-      <p:sp>
-        <p:nvSpPr>
-          <p:cNvPr id="82" name="TextBox 81"/>
+              <a:t>result</a:t>
+            </a:r>
+          </a:p>
+        </p:txBody>
+      </p:sp>
+      <p:sp>
+        <p:nvSpPr>
+          <p:cNvPr id="86" name="Rectangle 85"/>
+          <p:cNvSpPr/>
+          <p:nvPr/>
+        </p:nvSpPr>
+        <p:spPr>
+          <a:xfrm>
+            <a:off x="5948363" y="4956638"/>
+            <a:ext cx="152400" cy="171376"/>
+          </a:xfrm>
+          <a:prstGeom prst="rect">
+            <a:avLst/>
+          </a:prstGeom>
+          <a:solidFill>
+            <a:srgbClr val="0070C0"/>
+          </a:solidFill>
+          <a:ln>
+            <a:solidFill>
+              <a:srgbClr val="0070C0"/>
+            </a:solidFill>
+          </a:ln>
+          <a:effectLst/>
+        </p:spPr>
+        <p:style>
+          <a:lnRef idx="1">
+            <a:schemeClr val="accent3"/>
+          </a:lnRef>
+          <a:fillRef idx="2">
+            <a:schemeClr val="accent3"/>
+          </a:fillRef>
+          <a:effectRef idx="1">
+            <a:schemeClr val="accent3"/>
+          </a:effectRef>
+          <a:fontRef idx="minor">
+            <a:schemeClr val="dk1"/>
+          </a:fontRef>
+        </p:style>
+        <p:txBody>
+          <a:bodyPr rtlCol="0" anchor="ctr"/>
+          <a:lstStyle/>
+          <a:p>
+            <a:pPr algn="ctr"/>
+            <a:endParaRPr lang="en-SG" sz="1400"/>
+          </a:p>
+        </p:txBody>
+      </p:sp>
+      <p:cxnSp>
+        <p:nvCxnSpPr>
+          <p:cNvPr id="90" name="Straight Arrow Connector 89"/>
+          <p:cNvCxnSpPr/>
+          <p:nvPr/>
+        </p:nvCxnSpPr>
+        <p:spPr>
+          <a:xfrm>
+            <a:off x="5120737" y="5099949"/>
+            <a:ext cx="966624" cy="0"/>
+          </a:xfrm>
+          <a:prstGeom prst="straightConnector1">
+            <a:avLst/>
+          </a:prstGeom>
+          <a:ln w="19050">
+            <a:solidFill>
+              <a:srgbClr val="0070C0"/>
+            </a:solidFill>
+            <a:prstDash val="sysDash"/>
+            <a:headEnd type="arrow" w="med" len="med"/>
+            <a:tailEnd type="none" w="med" len="med"/>
+          </a:ln>
+        </p:spPr>
+        <p:style>
+          <a:lnRef idx="1">
+            <a:schemeClr val="accent1"/>
+          </a:lnRef>
+          <a:fillRef idx="0">
+            <a:schemeClr val="accent1"/>
+          </a:fillRef>
+          <a:effectRef idx="0">
+            <a:schemeClr val="accent1"/>
+          </a:effectRef>
+          <a:fontRef idx="minor">
+            <a:schemeClr val="tx1"/>
+          </a:fontRef>
+        </p:style>
+      </p:cxnSp>
+      <p:sp>
+        <p:nvSpPr>
+          <p:cNvPr id="93" name="TextBox 92"/>
           <p:cNvSpPr txBox="1"/>
           <p:nvPr/>
         </p:nvSpPr>
         <p:spPr>
           <a:xfrm>
-            <a:off x="2654692" y="4906798"/>
-            <a:ext cx="621216" cy="153888"/>
+            <a:off x="1620659" y="3619497"/>
+            <a:ext cx="220343" cy="138499"/>
           </a:xfrm>
           <a:prstGeom prst="rect">
             <a:avLst/>
@@ -4907,171 +4929,6 @@
           </a:lstStyle>
           <a:p>
             <a:r>
-              <a:rPr lang="en-US" sz="1000" dirty="0"/>
-              <a:t>result</a:t>
-            </a:r>
-          </a:p>
-        </p:txBody>
-      </p:sp>
-      <p:sp>
-        <p:nvSpPr>
-          <p:cNvPr id="83" name="TextBox 82"/>
-          <p:cNvSpPr txBox="1"/>
-          <p:nvPr/>
-        </p:nvSpPr>
-        <p:spPr>
-          <a:xfrm>
-            <a:off x="-87651" y="5065670"/>
-            <a:ext cx="762000" cy="138499"/>
-          </a:xfrm>
-          <a:prstGeom prst="rect">
-            <a:avLst/>
-          </a:prstGeom>
-          <a:noFill/>
-        </p:spPr>
-        <p:txBody>
-          <a:bodyPr wrap="square" lIns="0" tIns="0" rIns="0" bIns="0" rtlCol="0">
-            <a:spAutoFit/>
-          </a:bodyPr>
-          <a:lstStyle>
-            <a:defPPr>
-              <a:defRPr lang="en-US"/>
-            </a:defPPr>
-            <a:lvl1pPr algn="r">
-              <a:defRPr sz="1400">
-                <a:solidFill>
-                  <a:srgbClr val="0070C0"/>
-                </a:solidFill>
-              </a:defRPr>
-            </a:lvl1pPr>
-          </a:lstStyle>
-          <a:p>
-            <a:r>
-              <a:rPr lang="en-US" sz="900" dirty="0"/>
-              <a:t>result</a:t>
-            </a:r>
-          </a:p>
-        </p:txBody>
-      </p:sp>
-      <p:sp>
-        <p:nvSpPr>
-          <p:cNvPr id="86" name="Rectangle 85"/>
-          <p:cNvSpPr/>
-          <p:nvPr/>
-        </p:nvSpPr>
-        <p:spPr>
-          <a:xfrm>
-            <a:off x="5948363" y="4956638"/>
-            <a:ext cx="152400" cy="171376"/>
-          </a:xfrm>
-          <a:prstGeom prst="rect">
-            <a:avLst/>
-          </a:prstGeom>
-          <a:solidFill>
-            <a:srgbClr val="0070C0"/>
-          </a:solidFill>
-          <a:ln>
-            <a:solidFill>
-              <a:srgbClr val="0070C0"/>
-            </a:solidFill>
-          </a:ln>
-          <a:effectLst/>
-        </p:spPr>
-        <p:style>
-          <a:lnRef idx="1">
-            <a:schemeClr val="accent3"/>
-          </a:lnRef>
-          <a:fillRef idx="2">
-            <a:schemeClr val="accent3"/>
-          </a:fillRef>
-          <a:effectRef idx="1">
-            <a:schemeClr val="accent3"/>
-          </a:effectRef>
-          <a:fontRef idx="minor">
-            <a:schemeClr val="dk1"/>
-          </a:fontRef>
-        </p:style>
-        <p:txBody>
-          <a:bodyPr rtlCol="0" anchor="ctr"/>
-          <a:lstStyle/>
-          <a:p>
-            <a:pPr algn="ctr"/>
-            <a:endParaRPr lang="en-SG" sz="1400"/>
-          </a:p>
-        </p:txBody>
-      </p:sp>
-      <p:cxnSp>
-        <p:nvCxnSpPr>
-          <p:cNvPr id="90" name="Straight Arrow Connector 89"/>
-          <p:cNvCxnSpPr/>
-          <p:nvPr/>
-        </p:nvCxnSpPr>
-        <p:spPr>
-          <a:xfrm>
-            <a:off x="5120737" y="5099949"/>
-            <a:ext cx="966624" cy="0"/>
-          </a:xfrm>
-          <a:prstGeom prst="straightConnector1">
-            <a:avLst/>
-          </a:prstGeom>
-          <a:ln w="19050">
-            <a:solidFill>
-              <a:srgbClr val="0070C0"/>
-            </a:solidFill>
-            <a:prstDash val="sysDash"/>
-            <a:headEnd type="arrow" w="med" len="med"/>
-            <a:tailEnd type="none" w="med" len="med"/>
-          </a:ln>
-        </p:spPr>
-        <p:style>
-          <a:lnRef idx="1">
-            <a:schemeClr val="accent1"/>
-          </a:lnRef>
-          <a:fillRef idx="0">
-            <a:schemeClr val="accent1"/>
-          </a:fillRef>
-          <a:effectRef idx="0">
-            <a:schemeClr val="accent1"/>
-          </a:effectRef>
-          <a:fontRef idx="minor">
-            <a:schemeClr val="tx1"/>
-          </a:fontRef>
-        </p:style>
-      </p:cxnSp>
-      <p:sp>
-        <p:nvSpPr>
-          <p:cNvPr id="93" name="TextBox 92"/>
-          <p:cNvSpPr txBox="1"/>
-          <p:nvPr/>
-        </p:nvSpPr>
-        <p:spPr>
-          <a:xfrm>
-            <a:off x="1620659" y="3619497"/>
-            <a:ext cx="220343" cy="138499"/>
-          </a:xfrm>
-          <a:prstGeom prst="rect">
-            <a:avLst/>
-          </a:prstGeom>
-          <a:noFill/>
-        </p:spPr>
-        <p:txBody>
-          <a:bodyPr wrap="square" lIns="0" tIns="0" rIns="0" bIns="0" rtlCol="0">
-            <a:spAutoFit/>
-          </a:bodyPr>
-          <a:lstStyle>
-            <a:defPPr>
-              <a:defRPr lang="en-US"/>
-            </a:defPPr>
-            <a:lvl1pPr algn="r">
-              <a:defRPr sz="1400">
-                <a:solidFill>
-                  <a:srgbClr val="0070C0"/>
-                </a:solidFill>
-              </a:defRPr>
-            </a:lvl1pPr>
-          </a:lstStyle>
-          <a:p>
-            <a:r>
               <a:rPr lang="en-US" sz="900" dirty="0"/>
               <a:t>d</a:t>
             </a:r>
@@ -5135,7 +4992,7 @@
                   <a:schemeClr val="bg1"/>
                 </a:solidFill>
               </a:rPr>
-              <a:t>AddMedicalHistoy</a:t>
+              <a:t>FilterPatient</a:t>
             </a:r>
             <a:endParaRPr lang="en-US" sz="1200" dirty="0">
               <a:solidFill>
@@ -5761,7 +5618,7 @@
         </p:nvSpPr>
         <p:spPr>
           <a:xfrm rot="10800000" flipV="1">
-            <a:off x="5235760" y="4183944"/>
+            <a:off x="5243464" y="4017067"/>
             <a:ext cx="540859" cy="153888"/>
           </a:xfrm>
           <a:prstGeom prst="rect">
@@ -5792,7 +5649,7 @@
                   <a:srgbClr val="7030A0"/>
                 </a:solidFill>
               </a:rPr>
-              <a:t>q</a:t>
+              <a:t>p</a:t>
             </a:r>
           </a:p>
         </p:txBody>
@@ -5849,7 +5706,7 @@
         </p:nvSpPr>
         <p:spPr>
           <a:xfrm>
-            <a:off x="5060096" y="4339566"/>
+            <a:off x="5305119" y="4339030"/>
             <a:ext cx="1424846" cy="138499"/>
           </a:xfrm>
           <a:prstGeom prst="rect">
@@ -5880,7 +5737,7 @@
                   <a:srgbClr val="7030A0"/>
                 </a:solidFill>
               </a:rPr>
-              <a:t>updatePerson</a:t>
+              <a:t>updateFilteredPersonList</a:t>
             </a:r>
             <a:r>
               <a:rPr lang="en-US" sz="900" dirty="0">
@@ -5888,23 +5745,7 @@
                   <a:srgbClr val="7030A0"/>
                 </a:solidFill>
               </a:rPr>
-              <a:t>(</a:t>
-            </a:r>
-            <a:r>
-              <a:rPr lang="en-US" sz="900" dirty="0" err="1">
-                <a:solidFill>
-                  <a:srgbClr val="7030A0"/>
-                </a:solidFill>
-              </a:rPr>
-              <a:t>p,q</a:t>
-            </a:r>
-            <a:r>
-              <a:rPr lang="en-US" sz="900" dirty="0">
-                <a:solidFill>
-                  <a:srgbClr val="7030A0"/>
-                </a:solidFill>
-              </a:rPr>
-              <a:t>)</a:t>
+              <a:t>(p)</a:t>
             </a:r>
           </a:p>
         </p:txBody>

</xml_diff>

<commit_message>
update developerGuider sequence diagram
</commit_message>
<xml_diff>
--- a/docs/diagrams/AddMedicalHistorySequenceDiagram.pptx
+++ b/docs/diagrams/AddMedicalHistorySequenceDiagram.pptx
@@ -8,7 +8,7 @@
     <p:notesMasterId r:id="rId3"/>
   </p:notesMasterIdLst>
   <p:sldIdLst>
-    <p:sldId id="268" r:id="rId2"/>
+    <p:sldId id="269" r:id="rId2"/>
   </p:sldIdLst>
   <p:sldSz cx="9144000" cy="6858000" type="screen4x3"/>
   <p:notesSz cx="6858000" cy="9144000"/>
@@ -208,7 +208,7 @@
           <a:p>
             <a:fld id="{F5CC4B3F-88C1-4FFA-B1B6-F41C21DC6924}" type="datetimeFigureOut">
               <a:rPr lang="en-US" smtClean="0"/>
-              <a:t>10/24/18</a:t>
+              <a:t>11/11/18</a:t>
             </a:fld>
             <a:endParaRPr lang="en-US"/>
           </a:p>
@@ -654,7 +654,7 @@
           <a:p>
             <a:fld id="{78C97017-6FC3-485B-9764-EAC9E56C1D49}" type="datetimeFigureOut">
               <a:rPr lang="en-US" smtClean="0"/>
-              <a:t>10/24/18</a:t>
+              <a:t>11/11/18</a:t>
             </a:fld>
             <a:endParaRPr lang="en-US"/>
           </a:p>
@@ -822,7 +822,7 @@
           <a:p>
             <a:fld id="{78C97017-6FC3-485B-9764-EAC9E56C1D49}" type="datetimeFigureOut">
               <a:rPr lang="en-US" smtClean="0"/>
-              <a:t>10/24/18</a:t>
+              <a:t>11/11/18</a:t>
             </a:fld>
             <a:endParaRPr lang="en-US"/>
           </a:p>
@@ -1000,7 +1000,7 @@
           <a:p>
             <a:fld id="{78C97017-6FC3-485B-9764-EAC9E56C1D49}" type="datetimeFigureOut">
               <a:rPr lang="en-US" smtClean="0"/>
-              <a:t>10/24/18</a:t>
+              <a:t>11/11/18</a:t>
             </a:fld>
             <a:endParaRPr lang="en-US"/>
           </a:p>
@@ -1168,7 +1168,7 @@
           <a:p>
             <a:fld id="{78C97017-6FC3-485B-9764-EAC9E56C1D49}" type="datetimeFigureOut">
               <a:rPr lang="en-US" smtClean="0"/>
-              <a:t>10/24/18</a:t>
+              <a:t>11/11/18</a:t>
             </a:fld>
             <a:endParaRPr lang="en-US"/>
           </a:p>
@@ -1413,7 +1413,7 @@
           <a:p>
             <a:fld id="{78C97017-6FC3-485B-9764-EAC9E56C1D49}" type="datetimeFigureOut">
               <a:rPr lang="en-US" smtClean="0"/>
-              <a:t>10/24/18</a:t>
+              <a:t>11/11/18</a:t>
             </a:fld>
             <a:endParaRPr lang="en-US"/>
           </a:p>
@@ -1698,7 +1698,7 @@
           <a:p>
             <a:fld id="{78C97017-6FC3-485B-9764-EAC9E56C1D49}" type="datetimeFigureOut">
               <a:rPr lang="en-US" smtClean="0"/>
-              <a:t>10/24/18</a:t>
+              <a:t>11/11/18</a:t>
             </a:fld>
             <a:endParaRPr lang="en-US"/>
           </a:p>
@@ -2117,7 +2117,7 @@
           <a:p>
             <a:fld id="{78C97017-6FC3-485B-9764-EAC9E56C1D49}" type="datetimeFigureOut">
               <a:rPr lang="en-US" smtClean="0"/>
-              <a:t>10/24/18</a:t>
+              <a:t>11/11/18</a:t>
             </a:fld>
             <a:endParaRPr lang="en-US"/>
           </a:p>
@@ -2234,7 +2234,7 @@
           <a:p>
             <a:fld id="{78C97017-6FC3-485B-9764-EAC9E56C1D49}" type="datetimeFigureOut">
               <a:rPr lang="en-US" smtClean="0"/>
-              <a:t>10/24/18</a:t>
+              <a:t>11/11/18</a:t>
             </a:fld>
             <a:endParaRPr lang="en-US"/>
           </a:p>
@@ -2329,7 +2329,7 @@
           <a:p>
             <a:fld id="{78C97017-6FC3-485B-9764-EAC9E56C1D49}" type="datetimeFigureOut">
               <a:rPr lang="en-US" smtClean="0"/>
-              <a:t>10/24/18</a:t>
+              <a:t>11/11/18</a:t>
             </a:fld>
             <a:endParaRPr lang="en-US"/>
           </a:p>
@@ -2604,7 +2604,7 @@
           <a:p>
             <a:fld id="{78C97017-6FC3-485B-9764-EAC9E56C1D49}" type="datetimeFigureOut">
               <a:rPr lang="en-US" smtClean="0"/>
-              <a:t>10/24/18</a:t>
+              <a:t>11/11/18</a:t>
             </a:fld>
             <a:endParaRPr lang="en-US"/>
           </a:p>
@@ -2856,7 +2856,7 @@
           <a:p>
             <a:fld id="{78C97017-6FC3-485B-9764-EAC9E56C1D49}" type="datetimeFigureOut">
               <a:rPr lang="en-US" smtClean="0"/>
-              <a:t>10/24/18</a:t>
+              <a:t>11/11/18</a:t>
             </a:fld>
             <a:endParaRPr lang="en-US"/>
           </a:p>
@@ -3067,7 +3067,7 @@
           <a:p>
             <a:fld id="{78C97017-6FC3-485B-9764-EAC9E56C1D49}" type="datetimeFigureOut">
               <a:rPr lang="en-US" smtClean="0"/>
-              <a:t>10/24/18</a:t>
+              <a:t>11/11/18</a:t>
             </a:fld>
             <a:endParaRPr lang="en-US"/>
           </a:p>
@@ -3456,8 +3456,8 @@
         </p:nvSpPr>
         <p:spPr>
           <a:xfrm>
-            <a:off x="5856199" y="1740137"/>
-            <a:ext cx="3206009" cy="3567874"/>
+            <a:off x="5004966" y="1747075"/>
+            <a:ext cx="3294837" cy="3656187"/>
           </a:xfrm>
           <a:prstGeom prst="roundRect">
             <a:avLst>
@@ -3465,10 +3465,7 @@
             </a:avLst>
           </a:prstGeom>
           <a:solidFill>
-            <a:schemeClr val="accent4">
-              <a:lumMod val="20000"/>
-              <a:lumOff val="80000"/>
-            </a:schemeClr>
+            <a:srgbClr val="FFF3CC"/>
           </a:solidFill>
           <a:ln w="19050">
             <a:noFill/>
@@ -3513,7 +3510,7 @@
         <p:spPr>
           <a:xfrm>
             <a:off x="31783" y="1740138"/>
-            <a:ext cx="5867034" cy="3584374"/>
+            <a:ext cx="4903381" cy="3670062"/>
           </a:xfrm>
           <a:prstGeom prst="roundRect">
             <a:avLst>
@@ -3797,9 +3794,9 @@
           <p:nvPr/>
         </p:nvCxnSpPr>
         <p:spPr>
-          <a:xfrm>
-            <a:off x="2405314" y="2270587"/>
-            <a:ext cx="0" cy="1594592"/>
+          <a:xfrm flipH="1">
+            <a:off x="2398838" y="2270587"/>
+            <a:ext cx="6476" cy="1471112"/>
           </a:xfrm>
           <a:prstGeom prst="line">
             <a:avLst/>
@@ -3835,8 +3832,8 @@
         </p:nvSpPr>
         <p:spPr>
           <a:xfrm>
-            <a:off x="2329138" y="2642983"/>
-            <a:ext cx="174929" cy="1129459"/>
+            <a:off x="2314636" y="2642984"/>
+            <a:ext cx="168405" cy="856762"/>
           </a:xfrm>
           <a:prstGeom prst="rect">
             <a:avLst/>
@@ -3886,8 +3883,8 @@
         </p:nvSpPr>
         <p:spPr>
           <a:xfrm>
-            <a:off x="4628202" y="2731829"/>
-            <a:ext cx="1129245" cy="502700"/>
+            <a:off x="3492435" y="2295427"/>
+            <a:ext cx="1043416" cy="520203"/>
           </a:xfrm>
           <a:prstGeom prst="rect">
             <a:avLst/>
@@ -3927,7 +3924,7 @@
                   <a:schemeClr val="bg1"/>
                 </a:solidFill>
               </a:rPr>
-              <a:t>d:FilterPatient</a:t>
+              <a:t>a:AddMedicalHistory</a:t>
             </a:r>
             <a:br>
               <a:rPr lang="en-US" sz="1200" dirty="0">
@@ -3962,9 +3959,9 @@
           <p:nvPr/>
         </p:nvCxnSpPr>
         <p:spPr>
-          <a:xfrm>
-            <a:off x="5027536" y="3237231"/>
-            <a:ext cx="30355" cy="2070780"/>
+          <a:xfrm flipH="1">
+            <a:off x="4034625" y="2815630"/>
+            <a:ext cx="7710" cy="2492381"/>
           </a:xfrm>
           <a:prstGeom prst="line">
             <a:avLst/>
@@ -4000,8 +3997,8 @@
         </p:nvSpPr>
         <p:spPr>
           <a:xfrm>
-            <a:off x="4974834" y="3237231"/>
-            <a:ext cx="105404" cy="225927"/>
+            <a:off x="3955248" y="2815630"/>
+            <a:ext cx="174173" cy="237377"/>
           </a:xfrm>
           <a:prstGeom prst="rect">
             <a:avLst/>
@@ -4123,8 +4120,8 @@
         </p:nvSpPr>
         <p:spPr>
           <a:xfrm>
-            <a:off x="-18663" y="2546133"/>
-            <a:ext cx="1028758" cy="276999"/>
+            <a:off x="-60043" y="2546133"/>
+            <a:ext cx="1070138" cy="415498"/>
           </a:xfrm>
           <a:prstGeom prst="rect">
             <a:avLst/>
@@ -4155,49 +4152,11 @@
                   <a:srgbClr val="0070C0"/>
                 </a:solidFill>
               </a:rPr>
-              <a:t>(“filter-patient”)</a:t>
-            </a:r>
-          </a:p>
-        </p:txBody>
-      </p:sp>
-      <p:cxnSp>
-        <p:nvCxnSpPr>
-          <p:cNvPr id="28" name="Straight Arrow Connector 27"/>
-          <p:cNvCxnSpPr>
-            <a:cxnSpLocks/>
-          </p:cNvCxnSpPr>
-          <p:nvPr/>
-        </p:nvCxnSpPr>
-        <p:spPr>
-          <a:xfrm flipV="1">
-            <a:off x="3975245" y="3208184"/>
-            <a:ext cx="642532" cy="1"/>
-          </a:xfrm>
-          <a:prstGeom prst="straightConnector1">
-            <a:avLst/>
-          </a:prstGeom>
-          <a:ln w="19050">
-            <a:solidFill>
-              <a:srgbClr val="0070C0"/>
-            </a:solidFill>
-            <a:tailEnd type="arrow"/>
-          </a:ln>
-        </p:spPr>
-        <p:style>
-          <a:lnRef idx="1">
-            <a:schemeClr val="accent1"/>
-          </a:lnRef>
-          <a:fillRef idx="0">
-            <a:schemeClr val="accent1"/>
-          </a:fillRef>
-          <a:effectRef idx="0">
-            <a:schemeClr val="accent1"/>
-          </a:effectRef>
-          <a:fontRef idx="minor">
-            <a:schemeClr val="tx1"/>
-          </a:fontRef>
-        </p:style>
-      </p:cxnSp>
+              <a:t>(“add-medical-history”)</a:t>
+            </a:r>
+          </a:p>
+        </p:txBody>
+      </p:sp>
       <p:sp>
         <p:nvSpPr>
           <p:cNvPr id="29" name="TextBox 28"/>
@@ -4206,7 +4165,7 @@
         </p:nvSpPr>
         <p:spPr>
           <a:xfrm>
-            <a:off x="2503041" y="3927579"/>
+            <a:off x="2209604" y="3664755"/>
             <a:ext cx="855809" cy="153888"/>
           </a:xfrm>
           <a:prstGeom prst="rect">
@@ -4243,14 +4202,13 @@
           <p:cNvPr id="34" name="Straight Arrow Connector 33"/>
           <p:cNvCxnSpPr>
             <a:cxnSpLocks/>
-            <a:endCxn id="21" idx="2"/>
           </p:cNvCxnSpPr>
           <p:nvPr/>
         </p:nvCxnSpPr>
         <p:spPr>
           <a:xfrm>
-            <a:off x="3953139" y="3463158"/>
-            <a:ext cx="1074397" cy="0"/>
+            <a:off x="2467373" y="3071248"/>
+            <a:ext cx="1581286" cy="0"/>
           </a:xfrm>
           <a:prstGeom prst="straightConnector1">
             <a:avLst/>
@@ -4289,7 +4247,7 @@
         </p:nvCxnSpPr>
         <p:spPr>
           <a:xfrm>
-            <a:off x="1144475" y="3785793"/>
+            <a:off x="1142387" y="3491305"/>
             <a:ext cx="1172249" cy="0"/>
           </a:xfrm>
           <a:prstGeom prst="straightConnector1">
@@ -4367,17 +4325,14 @@
         </p:nvSpPr>
         <p:spPr>
           <a:xfrm>
-            <a:off x="5853451" y="2857049"/>
-            <a:ext cx="1082085" cy="474476"/>
+            <a:off x="5146095" y="2996497"/>
+            <a:ext cx="802576" cy="238408"/>
           </a:xfrm>
           <a:prstGeom prst="rect">
             <a:avLst/>
           </a:prstGeom>
           <a:solidFill>
-            <a:schemeClr val="accent4">
-              <a:lumMod val="60000"/>
-              <a:lumOff val="40000"/>
-            </a:schemeClr>
+            <a:srgbClr val="7030A0"/>
           </a:solidFill>
           <a:ln w="19050">
             <a:solidFill>
@@ -4409,12 +4364,12 @@
           <a:p>
             <a:pPr algn="ctr"/>
             <a:r>
-              <a:rPr lang="en-US" sz="1200" dirty="0" err="1">
+              <a:rPr lang="en-US" sz="1200" dirty="0">
                 <a:solidFill>
                   <a:schemeClr val="bg1"/>
                 </a:solidFill>
               </a:rPr>
-              <a:t>p:TagContainsPatientPredicate</a:t>
+              <a:t>:Model</a:t>
             </a:r>
             <a:endParaRPr lang="en-SG" sz="1200" dirty="0">
               <a:solidFill>
@@ -4429,13 +4384,14 @@
           <p:cNvPr id="64" name="Straight Arrow Connector 63"/>
           <p:cNvCxnSpPr>
             <a:cxnSpLocks/>
+            <a:endCxn id="65" idx="0"/>
           </p:cNvCxnSpPr>
           <p:nvPr/>
         </p:nvCxnSpPr>
         <p:spPr>
           <a:xfrm>
-            <a:off x="1177443" y="3918885"/>
-            <a:ext cx="3752367" cy="5992"/>
+            <a:off x="1074515" y="3848780"/>
+            <a:ext cx="2940017" cy="4888"/>
           </a:xfrm>
           <a:prstGeom prst="straightConnector1">
             <a:avLst/>
@@ -4470,7 +4426,7 @@
         </p:nvSpPr>
         <p:spPr>
           <a:xfrm>
-            <a:off x="4964344" y="3880176"/>
+            <a:off x="3936335" y="3853668"/>
             <a:ext cx="156393" cy="1247838"/>
           </a:xfrm>
           <a:prstGeom prst="rect">
@@ -4518,19 +4474,16 @@
           <p:nvPr/>
         </p:nvCxnSpPr>
         <p:spPr>
-          <a:xfrm flipH="1">
-            <a:off x="7333818" y="2845589"/>
-            <a:ext cx="7494" cy="2358580"/>
+          <a:xfrm>
+            <a:off x="7099853" y="3491305"/>
+            <a:ext cx="28815" cy="1504985"/>
           </a:xfrm>
           <a:prstGeom prst="line">
             <a:avLst/>
           </a:prstGeom>
           <a:ln w="19050">
             <a:solidFill>
-              <a:schemeClr val="accent4">
-                <a:lumMod val="60000"/>
-                <a:lumOff val="40000"/>
-              </a:schemeClr>
+              <a:srgbClr val="7030A0"/>
             </a:solidFill>
             <a:prstDash val="sysDash"/>
           </a:ln>
@@ -4559,17 +4512,14 @@
         </p:nvSpPr>
         <p:spPr>
           <a:xfrm>
-            <a:off x="7253705" y="4272673"/>
-            <a:ext cx="160226" cy="272929"/>
+            <a:off x="7048554" y="4105816"/>
+            <a:ext cx="190445" cy="542384"/>
           </a:xfrm>
           <a:prstGeom prst="rect">
             <a:avLst/>
           </a:prstGeom>
           <a:solidFill>
-            <a:schemeClr val="accent4">
-              <a:lumMod val="60000"/>
-              <a:lumOff val="40000"/>
-            </a:schemeClr>
+            <a:srgbClr val="7030A0"/>
           </a:solidFill>
           <a:ln>
             <a:solidFill>
@@ -4610,44 +4560,6 @@
       </p:sp>
       <p:cxnSp>
         <p:nvCxnSpPr>
-          <p:cNvPr id="75" name="Straight Arrow Connector 74"/>
-          <p:cNvCxnSpPr>
-            <a:cxnSpLocks/>
-          </p:cNvCxnSpPr>
-          <p:nvPr/>
-        </p:nvCxnSpPr>
-        <p:spPr>
-          <a:xfrm>
-            <a:off x="5148820" y="3927579"/>
-            <a:ext cx="1023380" cy="0"/>
-          </a:xfrm>
-          <a:prstGeom prst="straightConnector1">
-            <a:avLst/>
-          </a:prstGeom>
-          <a:ln w="19050">
-            <a:solidFill>
-              <a:srgbClr val="0070C0"/>
-            </a:solidFill>
-            <a:tailEnd type="arrow"/>
-          </a:ln>
-        </p:spPr>
-        <p:style>
-          <a:lnRef idx="1">
-            <a:schemeClr val="accent1"/>
-          </a:lnRef>
-          <a:fillRef idx="0">
-            <a:schemeClr val="accent1"/>
-          </a:fillRef>
-          <a:effectRef idx="0">
-            <a:schemeClr val="accent1"/>
-          </a:effectRef>
-          <a:fontRef idx="minor">
-            <a:schemeClr val="tx1"/>
-          </a:fontRef>
-        </p:style>
-      </p:cxnSp>
-      <p:cxnSp>
-        <p:nvCxnSpPr>
           <p:cNvPr id="76" name="Straight Arrow Connector 75"/>
           <p:cNvCxnSpPr>
             <a:cxnSpLocks/>
@@ -4657,18 +4569,15 @@
         </p:nvCxnSpPr>
         <p:spPr>
           <a:xfrm>
-            <a:off x="5146095" y="4545602"/>
-            <a:ext cx="2187723" cy="0"/>
+            <a:off x="5593919" y="4633927"/>
+            <a:ext cx="1549858" cy="14273"/>
           </a:xfrm>
           <a:prstGeom prst="straightConnector1">
             <a:avLst/>
           </a:prstGeom>
           <a:ln w="19050">
             <a:solidFill>
-              <a:schemeClr val="accent4">
-                <a:lumMod val="60000"/>
-                <a:lumOff val="40000"/>
-              </a:schemeClr>
+              <a:srgbClr val="7030A0"/>
             </a:solidFill>
             <a:prstDash val="sysDash"/>
             <a:headEnd type="arrow" w="med" len="med"/>
@@ -4695,13 +4604,14 @@
           <p:cNvPr id="77" name="Straight Arrow Connector 76"/>
           <p:cNvCxnSpPr>
             <a:cxnSpLocks/>
+            <a:endCxn id="65" idx="2"/>
           </p:cNvCxnSpPr>
           <p:nvPr/>
         </p:nvCxnSpPr>
         <p:spPr>
           <a:xfrm>
             <a:off x="1157660" y="5099949"/>
-            <a:ext cx="3817174" cy="0"/>
+            <a:ext cx="2856872" cy="1557"/>
           </a:xfrm>
           <a:prstGeom prst="straightConnector1">
             <a:avLst/>
@@ -4732,14 +4642,14 @@
       </p:cxnSp>
       <p:sp>
         <p:nvSpPr>
-          <p:cNvPr id="82" name="TextBox 81"/>
+          <p:cNvPr id="80" name="TextBox 79"/>
           <p:cNvSpPr txBox="1"/>
           <p:nvPr/>
         </p:nvSpPr>
         <p:spPr>
           <a:xfrm>
-            <a:off x="2654692" y="4906798"/>
-            <a:ext cx="621216" cy="153888"/>
+            <a:off x="666817" y="2696247"/>
+            <a:ext cx="1596780" cy="307777"/>
           </a:xfrm>
           <a:prstGeom prst="rect">
             <a:avLst/>
@@ -4764,22 +4674,36 @@
           </a:lstStyle>
           <a:p>
             <a:r>
-              <a:rPr lang="en-US" sz="1000" dirty="0"/>
-              <a:t>result</a:t>
-            </a:r>
-          </a:p>
-        </p:txBody>
-      </p:sp>
-      <p:sp>
-        <p:nvSpPr>
-          <p:cNvPr id="83" name="TextBox 82"/>
+              <a:rPr lang="en-US" sz="900" dirty="0"/>
+              <a:t>parse</a:t>
+            </a:r>
+          </a:p>
+          <a:p>
+            <a:r>
+              <a:rPr lang="en-US" sz="900" dirty="0"/>
+              <a:t>(“add</a:t>
+            </a:r>
+            <a:r>
+              <a:rPr lang="en-US" altLang="zh-CN" sz="900" dirty="0"/>
+              <a:t>-medical-history</a:t>
+            </a:r>
+            <a:r>
+              <a:rPr lang="en-US" sz="1100" dirty="0"/>
+              <a:t>”)</a:t>
+            </a:r>
+          </a:p>
+        </p:txBody>
+      </p:sp>
+      <p:sp>
+        <p:nvSpPr>
+          <p:cNvPr id="82" name="TextBox 81"/>
           <p:cNvSpPr txBox="1"/>
           <p:nvPr/>
         </p:nvSpPr>
         <p:spPr>
           <a:xfrm>
-            <a:off x="-87651" y="5065670"/>
-            <a:ext cx="762000" cy="138499"/>
+            <a:off x="2252586" y="4917503"/>
+            <a:ext cx="621216" cy="153888"/>
           </a:xfrm>
           <a:prstGeom prst="rect">
             <a:avLst/>
@@ -4804,7 +4728,7 @@
           </a:lstStyle>
           <a:p>
             <a:r>
-              <a:rPr lang="en-US" sz="900" dirty="0"/>
+              <a:rPr lang="en-US" sz="1000" dirty="0"/>
               <a:t>result</a:t>
             </a:r>
           </a:p>
@@ -4812,99 +4736,14 @@
       </p:sp>
       <p:sp>
         <p:nvSpPr>
-          <p:cNvPr id="86" name="Rectangle 85"/>
-          <p:cNvSpPr/>
-          <p:nvPr/>
-        </p:nvSpPr>
-        <p:spPr>
-          <a:xfrm>
-            <a:off x="5948363" y="4956638"/>
-            <a:ext cx="152400" cy="171376"/>
-          </a:xfrm>
-          <a:prstGeom prst="rect">
-            <a:avLst/>
-          </a:prstGeom>
-          <a:solidFill>
-            <a:srgbClr val="0070C0"/>
-          </a:solidFill>
-          <a:ln>
-            <a:solidFill>
-              <a:srgbClr val="0070C0"/>
-            </a:solidFill>
-          </a:ln>
-          <a:effectLst/>
-        </p:spPr>
-        <p:style>
-          <a:lnRef idx="1">
-            <a:schemeClr val="accent3"/>
-          </a:lnRef>
-          <a:fillRef idx="2">
-            <a:schemeClr val="accent3"/>
-          </a:fillRef>
-          <a:effectRef idx="1">
-            <a:schemeClr val="accent3"/>
-          </a:effectRef>
-          <a:fontRef idx="minor">
-            <a:schemeClr val="dk1"/>
-          </a:fontRef>
-        </p:style>
-        <p:txBody>
-          <a:bodyPr rtlCol="0" anchor="ctr"/>
-          <a:lstStyle/>
-          <a:p>
-            <a:pPr algn="ctr"/>
-            <a:endParaRPr lang="en-SG" sz="1400"/>
-          </a:p>
-        </p:txBody>
-      </p:sp>
-      <p:cxnSp>
-        <p:nvCxnSpPr>
-          <p:cNvPr id="90" name="Straight Arrow Connector 89"/>
-          <p:cNvCxnSpPr/>
-          <p:nvPr/>
-        </p:nvCxnSpPr>
-        <p:spPr>
-          <a:xfrm>
-            <a:off x="5120737" y="5099949"/>
-            <a:ext cx="966624" cy="0"/>
-          </a:xfrm>
-          <a:prstGeom prst="straightConnector1">
-            <a:avLst/>
-          </a:prstGeom>
-          <a:ln w="19050">
-            <a:solidFill>
-              <a:srgbClr val="0070C0"/>
-            </a:solidFill>
-            <a:prstDash val="sysDash"/>
-            <a:headEnd type="arrow" w="med" len="med"/>
-            <a:tailEnd type="none" w="med" len="med"/>
-          </a:ln>
-        </p:spPr>
-        <p:style>
-          <a:lnRef idx="1">
-            <a:schemeClr val="accent1"/>
-          </a:lnRef>
-          <a:fillRef idx="0">
-            <a:schemeClr val="accent1"/>
-          </a:fillRef>
-          <a:effectRef idx="0">
-            <a:schemeClr val="accent1"/>
-          </a:effectRef>
-          <a:fontRef idx="minor">
-            <a:schemeClr val="tx1"/>
-          </a:fontRef>
-        </p:style>
-      </p:cxnSp>
-      <p:sp>
-        <p:nvSpPr>
-          <p:cNvPr id="93" name="TextBox 92"/>
+          <p:cNvPr id="83" name="TextBox 82"/>
           <p:cNvSpPr txBox="1"/>
           <p:nvPr/>
         </p:nvSpPr>
         <p:spPr>
           <a:xfrm>
-            <a:off x="1620659" y="3619497"/>
-            <a:ext cx="220343" cy="138499"/>
+            <a:off x="-87651" y="5065670"/>
+            <a:ext cx="762000" cy="138499"/>
           </a:xfrm>
           <a:prstGeom prst="rect">
             <a:avLst/>
@@ -4930,275 +4769,63 @@
           <a:p>
             <a:r>
               <a:rPr lang="en-US" sz="900" dirty="0"/>
-              <a:t>d</a:t>
-            </a:r>
-          </a:p>
-        </p:txBody>
-      </p:sp>
-      <p:sp>
-        <p:nvSpPr>
-          <p:cNvPr id="40" name="Rectangle 62"/>
-          <p:cNvSpPr/>
+              <a:t>result</a:t>
+            </a:r>
+          </a:p>
+        </p:txBody>
+      </p:sp>
+      <p:sp>
+        <p:nvSpPr>
+          <p:cNvPr id="93" name="TextBox 92"/>
+          <p:cNvSpPr txBox="1"/>
           <p:nvPr/>
         </p:nvSpPr>
         <p:spPr>
           <a:xfrm>
-            <a:off x="3183125" y="2486322"/>
-            <a:ext cx="1378279" cy="406397"/>
+            <a:off x="1631870" y="3293104"/>
+            <a:ext cx="220343" cy="138499"/>
           </a:xfrm>
           <a:prstGeom prst="rect">
             <a:avLst/>
           </a:prstGeom>
-          <a:solidFill>
-            <a:srgbClr val="0070C0"/>
-          </a:solidFill>
-          <a:ln w="19050">
-            <a:solidFill>
-              <a:srgbClr val="0070C0"/>
-            </a:solidFill>
-          </a:ln>
-          <a:effectLst/>
-        </p:spPr>
-        <p:style>
-          <a:lnRef idx="1">
-            <a:schemeClr val="accent2"/>
-          </a:lnRef>
-          <a:fillRef idx="2">
-            <a:schemeClr val="accent2"/>
-          </a:fillRef>
-          <a:effectRef idx="1">
-            <a:schemeClr val="accent2"/>
-          </a:effectRef>
-          <a:fontRef idx="minor">
-            <a:schemeClr val="dk1"/>
-          </a:fontRef>
-        </p:style>
-        <p:txBody>
-          <a:bodyPr rtlCol="0" anchor="ctr"/>
-          <a:lstStyle/>
-          <a:p>
-            <a:pPr algn="ctr"/>
-            <a:r>
-              <a:rPr lang="en-US" sz="1200" dirty="0">
+          <a:noFill/>
+        </p:spPr>
+        <p:txBody>
+          <a:bodyPr wrap="square" lIns="0" tIns="0" rIns="0" bIns="0" rtlCol="0">
+            <a:spAutoFit/>
+          </a:bodyPr>
+          <a:lstStyle>
+            <a:defPPr>
+              <a:defRPr lang="en-US"/>
+            </a:defPPr>
+            <a:lvl1pPr algn="r">
+              <a:defRPr sz="1400">
                 <a:solidFill>
-                  <a:schemeClr val="bg1"/>
+                  <a:srgbClr val="0070C0"/>
                 </a:solidFill>
-              </a:rPr>
-              <a:t>:</a:t>
-            </a:r>
-            <a:r>
-              <a:rPr lang="en-US" sz="1200" dirty="0" err="1">
-                <a:solidFill>
-                  <a:schemeClr val="bg1"/>
-                </a:solidFill>
-              </a:rPr>
-              <a:t>FilterPatient</a:t>
-            </a:r>
-            <a:endParaRPr lang="en-US" sz="1200" dirty="0">
-              <a:solidFill>
-                <a:schemeClr val="bg1"/>
-              </a:solidFill>
-            </a:endParaRPr>
-          </a:p>
-          <a:p>
-            <a:pPr algn="ctr"/>
-            <a:r>
-              <a:rPr lang="en-US" sz="1200" dirty="0" err="1">
-                <a:solidFill>
-                  <a:schemeClr val="bg1"/>
-                </a:solidFill>
-              </a:rPr>
-              <a:t>CommandParser</a:t>
-            </a:r>
-            <a:endParaRPr lang="en-SG" sz="1200" dirty="0">
-              <a:solidFill>
-                <a:schemeClr val="bg1"/>
-              </a:solidFill>
-            </a:endParaRPr>
+              </a:defRPr>
+            </a:lvl1pPr>
+          </a:lstStyle>
+          <a:p>
+            <a:r>
+              <a:rPr lang="en-US" sz="900" dirty="0"/>
+              <a:t>a</a:t>
+            </a:r>
           </a:p>
         </p:txBody>
       </p:sp>
       <p:cxnSp>
         <p:nvCxnSpPr>
-          <p:cNvPr id="8" name="Straight Arrow Connector 7"/>
+          <p:cNvPr id="50" name="Straight Arrow Connector 49"/>
           <p:cNvCxnSpPr>
             <a:cxnSpLocks/>
           </p:cNvCxnSpPr>
           <p:nvPr/>
         </p:nvCxnSpPr>
         <p:spPr>
-          <a:xfrm>
-            <a:off x="2492115" y="3260080"/>
-            <a:ext cx="1314300" cy="0"/>
-          </a:xfrm>
-          <a:prstGeom prst="straightConnector1">
-            <a:avLst/>
-          </a:prstGeom>
-          <a:ln w="19050">
-            <a:headEnd type="none" w="med" len="med"/>
-            <a:tailEnd type="arrow" w="med" len="med"/>
-          </a:ln>
-        </p:spPr>
-        <p:style>
-          <a:lnRef idx="1">
-            <a:schemeClr val="accent1"/>
-          </a:lnRef>
-          <a:fillRef idx="0">
-            <a:schemeClr val="accent1"/>
-          </a:fillRef>
-          <a:effectRef idx="0">
-            <a:schemeClr val="accent1"/>
-          </a:effectRef>
-          <a:fontRef idx="minor">
-            <a:schemeClr val="tx1"/>
-          </a:fontRef>
-        </p:style>
-      </p:cxnSp>
-      <p:sp>
-        <p:nvSpPr>
-          <p:cNvPr id="45" name="Rectangle 44"/>
-          <p:cNvSpPr/>
-          <p:nvPr/>
-        </p:nvSpPr>
-        <p:spPr>
-          <a:xfrm>
-            <a:off x="3766621" y="2900291"/>
-            <a:ext cx="205843" cy="123165"/>
-          </a:xfrm>
-          <a:prstGeom prst="rect">
-            <a:avLst/>
-          </a:prstGeom>
-          <a:solidFill>
-            <a:srgbClr val="0070C0"/>
-          </a:solidFill>
-          <a:ln>
-            <a:solidFill>
-              <a:srgbClr val="0070C0"/>
-            </a:solidFill>
-          </a:ln>
-          <a:effectLst/>
-        </p:spPr>
-        <p:style>
-          <a:lnRef idx="1">
-            <a:schemeClr val="accent3"/>
-          </a:lnRef>
-          <a:fillRef idx="2">
-            <a:schemeClr val="accent3"/>
-          </a:fillRef>
-          <a:effectRef idx="1">
-            <a:schemeClr val="accent3"/>
-          </a:effectRef>
-          <a:fontRef idx="minor">
-            <a:schemeClr val="dk1"/>
-          </a:fontRef>
-        </p:style>
-        <p:txBody>
-          <a:bodyPr rtlCol="0" anchor="ctr"/>
-          <a:lstStyle/>
-          <a:p>
-            <a:pPr algn="ctr"/>
-            <a:endParaRPr lang="en-SG" sz="1400" dirty="0"/>
-          </a:p>
-        </p:txBody>
-      </p:sp>
-      <p:cxnSp>
-        <p:nvCxnSpPr>
-          <p:cNvPr id="46" name="Straight Connector 45"/>
-          <p:cNvCxnSpPr>
-            <a:cxnSpLocks/>
-          </p:cNvCxnSpPr>
-          <p:nvPr/>
-        </p:nvCxnSpPr>
-        <p:spPr>
-          <a:xfrm flipH="1">
-            <a:off x="3865514" y="3037187"/>
-            <a:ext cx="15297" cy="748606"/>
-          </a:xfrm>
-          <a:prstGeom prst="line">
-            <a:avLst/>
-          </a:prstGeom>
-          <a:ln w="19050">
-            <a:solidFill>
-              <a:srgbClr val="0070C0"/>
-            </a:solidFill>
-            <a:prstDash val="sysDash"/>
-          </a:ln>
-          <a:effectLst/>
-        </p:spPr>
-        <p:style>
-          <a:lnRef idx="1">
-            <a:schemeClr val="accent1"/>
-          </a:lnRef>
-          <a:fillRef idx="2">
-            <a:schemeClr val="accent1"/>
-          </a:fillRef>
-          <a:effectRef idx="1">
-            <a:schemeClr val="accent1"/>
-          </a:effectRef>
-          <a:fontRef idx="minor">
-            <a:schemeClr val="dk1"/>
-          </a:fontRef>
-        </p:style>
-      </p:cxnSp>
-      <p:sp>
-        <p:nvSpPr>
-          <p:cNvPr id="49" name="Rectangle 48"/>
-          <p:cNvSpPr/>
-          <p:nvPr/>
-        </p:nvSpPr>
-        <p:spPr>
-          <a:xfrm>
-            <a:off x="3777890" y="3181973"/>
-            <a:ext cx="175249" cy="469929"/>
-          </a:xfrm>
-          <a:prstGeom prst="rect">
-            <a:avLst/>
-          </a:prstGeom>
-          <a:solidFill>
-            <a:srgbClr val="0070C0"/>
-          </a:solidFill>
-          <a:ln>
-            <a:solidFill>
-              <a:srgbClr val="0070C0"/>
-            </a:solidFill>
-          </a:ln>
-          <a:effectLst/>
-        </p:spPr>
-        <p:style>
-          <a:lnRef idx="1">
-            <a:schemeClr val="accent3"/>
-          </a:lnRef>
-          <a:fillRef idx="2">
-            <a:schemeClr val="accent3"/>
-          </a:fillRef>
-          <a:effectRef idx="1">
-            <a:schemeClr val="accent3"/>
-          </a:effectRef>
-          <a:fontRef idx="minor">
-            <a:schemeClr val="dk1"/>
-          </a:fontRef>
-        </p:style>
-        <p:txBody>
-          <a:bodyPr rtlCol="0" anchor="ctr"/>
-          <a:lstStyle/>
-          <a:p>
-            <a:pPr algn="ctr"/>
-            <a:endParaRPr lang="en-SG" sz="1400"/>
-          </a:p>
-        </p:txBody>
-      </p:sp>
-      <p:cxnSp>
-        <p:nvCxnSpPr>
-          <p:cNvPr id="51" name="Straight Arrow Connector 50"/>
-          <p:cNvCxnSpPr>
-            <a:cxnSpLocks/>
-          </p:cNvCxnSpPr>
-          <p:nvPr/>
-        </p:nvCxnSpPr>
-        <p:spPr>
-          <a:xfrm>
-            <a:off x="2488372" y="3632837"/>
-            <a:ext cx="1278249" cy="0"/>
+          <a:xfrm flipV="1">
+            <a:off x="2489365" y="2721573"/>
+            <a:ext cx="1003070" cy="3703"/>
           </a:xfrm>
           <a:prstGeom prst="straightConnector1">
             <a:avLst/>
@@ -5207,9 +4834,7 @@
             <a:solidFill>
               <a:srgbClr val="0070C0"/>
             </a:solidFill>
-            <a:prstDash val="sysDash"/>
-            <a:headEnd type="arrow" w="med" len="med"/>
-            <a:tailEnd type="none" w="med" len="med"/>
+            <a:tailEnd type="arrow"/>
           </a:ln>
         </p:spPr>
         <p:style>
@@ -5229,21 +4854,138 @@
       </p:cxnSp>
       <p:cxnSp>
         <p:nvCxnSpPr>
-          <p:cNvPr id="13" name="Straight Arrow Connector 12"/>
-          <p:cNvCxnSpPr/>
+          <p:cNvPr id="74" name="Straight Connector 70">
+            <a:extLst>
+              <a:ext uri="{FF2B5EF4-FFF2-40B4-BE49-F238E27FC236}">
+                <a16:creationId xmlns:a16="http://schemas.microsoft.com/office/drawing/2014/main" id="{3C5E4B8D-C49A-FF4C-B2DF-24E2514AB45D}"/>
+              </a:ext>
+            </a:extLst>
+          </p:cNvPr>
+          <p:cNvCxnSpPr>
+            <a:cxnSpLocks/>
+          </p:cNvCxnSpPr>
           <p:nvPr/>
         </p:nvCxnSpPr>
         <p:spPr>
           <a:xfrm>
-            <a:off x="5154636" y="4739582"/>
-            <a:ext cx="162246" cy="0"/>
+            <a:off x="5549721" y="3234905"/>
+            <a:ext cx="0" cy="1635994"/>
+          </a:xfrm>
+          <a:prstGeom prst="line">
+            <a:avLst/>
+          </a:prstGeom>
+          <a:ln w="19050">
+            <a:solidFill>
+              <a:srgbClr val="7030A0"/>
+            </a:solidFill>
+            <a:prstDash val="sysDash"/>
+          </a:ln>
+          <a:effectLst/>
+        </p:spPr>
+        <p:style>
+          <a:lnRef idx="1">
+            <a:schemeClr val="accent1"/>
+          </a:lnRef>
+          <a:fillRef idx="2">
+            <a:schemeClr val="accent1"/>
+          </a:fillRef>
+          <a:effectRef idx="1">
+            <a:schemeClr val="accent1"/>
+          </a:effectRef>
+          <a:fontRef idx="minor">
+            <a:schemeClr val="dk1"/>
+          </a:fontRef>
+        </p:style>
+      </p:cxnSp>
+      <p:sp>
+        <p:nvSpPr>
+          <p:cNvPr id="85" name="Rectangle 72">
+            <a:extLst>
+              <a:ext uri="{FF2B5EF4-FFF2-40B4-BE49-F238E27FC236}">
+                <a16:creationId xmlns:a16="http://schemas.microsoft.com/office/drawing/2014/main" id="{3A77499D-19EC-794E-A5C5-26EFCB5ED155}"/>
+              </a:ext>
+            </a:extLst>
+          </p:cNvPr>
+          <p:cNvSpPr/>
+          <p:nvPr/>
+        </p:nvSpPr>
+        <p:spPr>
+          <a:xfrm>
+            <a:off x="5475014" y="3961028"/>
+            <a:ext cx="169298" cy="687172"/>
+          </a:xfrm>
+          <a:prstGeom prst="rect">
+            <a:avLst/>
+          </a:prstGeom>
+          <a:solidFill>
+            <a:srgbClr val="7030A0"/>
+          </a:solidFill>
+          <a:ln>
+            <a:solidFill>
+              <a:schemeClr val="accent4">
+                <a:lumMod val="60000"/>
+                <a:lumOff val="40000"/>
+              </a:schemeClr>
+            </a:solidFill>
+          </a:ln>
+          <a:effectLst/>
+        </p:spPr>
+        <p:style>
+          <a:lnRef idx="1">
+            <a:schemeClr val="accent3"/>
+          </a:lnRef>
+          <a:fillRef idx="2">
+            <a:schemeClr val="accent3"/>
+          </a:fillRef>
+          <a:effectRef idx="1">
+            <a:schemeClr val="accent3"/>
+          </a:effectRef>
+          <a:fontRef idx="minor">
+            <a:schemeClr val="dk1"/>
+          </a:fontRef>
+        </p:style>
+        <p:txBody>
+          <a:bodyPr rtlCol="0" anchor="ctr"/>
+          <a:lstStyle/>
+          <a:p>
+            <a:pPr algn="ctr"/>
+            <a:endParaRPr lang="en-SG" sz="1400">
+              <a:solidFill>
+                <a:schemeClr val="dk1"/>
+              </a:solidFill>
+            </a:endParaRPr>
+          </a:p>
+        </p:txBody>
+      </p:sp>
+      <p:cxnSp>
+        <p:nvCxnSpPr>
+          <p:cNvPr id="87" name="Straight Arrow Connector 75">
+            <a:extLst>
+              <a:ext uri="{FF2B5EF4-FFF2-40B4-BE49-F238E27FC236}">
+                <a16:creationId xmlns:a16="http://schemas.microsoft.com/office/drawing/2014/main" id="{7CF7ECA5-86DB-CF42-9365-87754163FDB3}"/>
+              </a:ext>
+            </a:extLst>
+          </p:cNvPr>
+          <p:cNvCxnSpPr>
+            <a:cxnSpLocks/>
+          </p:cNvCxnSpPr>
+          <p:nvPr/>
+        </p:nvCxnSpPr>
+        <p:spPr>
+          <a:xfrm>
+            <a:off x="4127643" y="4648200"/>
+            <a:ext cx="1342310" cy="0"/>
           </a:xfrm>
           <a:prstGeom prst="straightConnector1">
             <a:avLst/>
           </a:prstGeom>
           <a:ln w="19050">
-            <a:headEnd type="none" w="med" len="med"/>
-            <a:tailEnd type="arrow" w="med" len="med"/>
+            <a:solidFill>
+              <a:srgbClr val="7030A0"/>
+            </a:solidFill>
+            <a:prstDash val="sysDash"/>
+            <a:headEnd type="arrow" w="med" len="med"/>
+            <a:tailEnd type="none" w="med" len="med"/>
           </a:ln>
         </p:spPr>
         <p:style>
@@ -5261,9 +5003,91 @@
           </a:fontRef>
         </p:style>
       </p:cxnSp>
+      <p:sp>
+        <p:nvSpPr>
+          <p:cNvPr id="88" name="Rectangle 62">
+            <a:extLst>
+              <a:ext uri="{FF2B5EF4-FFF2-40B4-BE49-F238E27FC236}">
+                <a16:creationId xmlns:a16="http://schemas.microsoft.com/office/drawing/2014/main" id="{F7BA9BAF-B03F-A340-B807-FCD99F49A49E}"/>
+              </a:ext>
+            </a:extLst>
+          </p:cNvPr>
+          <p:cNvSpPr/>
+          <p:nvPr/>
+        </p:nvSpPr>
+        <p:spPr>
+          <a:xfrm>
+            <a:off x="6238632" y="3269557"/>
+            <a:ext cx="1762368" cy="229164"/>
+          </a:xfrm>
+          <a:prstGeom prst="rect">
+            <a:avLst/>
+          </a:prstGeom>
+          <a:solidFill>
+            <a:srgbClr val="7030A0"/>
+          </a:solidFill>
+          <a:ln w="19050">
+            <a:solidFill>
+              <a:schemeClr val="accent4">
+                <a:lumMod val="60000"/>
+                <a:lumOff val="40000"/>
+              </a:schemeClr>
+            </a:solidFill>
+          </a:ln>
+          <a:effectLst/>
+        </p:spPr>
+        <p:style>
+          <a:lnRef idx="1">
+            <a:schemeClr val="accent2"/>
+          </a:lnRef>
+          <a:fillRef idx="2">
+            <a:schemeClr val="accent2"/>
+          </a:fillRef>
+          <a:effectRef idx="1">
+            <a:schemeClr val="accent2"/>
+          </a:effectRef>
+          <a:fontRef idx="minor">
+            <a:schemeClr val="dk1"/>
+          </a:fontRef>
+        </p:style>
+        <p:txBody>
+          <a:bodyPr rtlCol="0" anchor="ctr"/>
+          <a:lstStyle/>
+          <a:p>
+            <a:pPr algn="ctr"/>
+            <a:r>
+              <a:rPr lang="en-US" sz="1200" dirty="0">
+                <a:solidFill>
+                  <a:schemeClr val="bg1"/>
+                </a:solidFill>
+              </a:rPr>
+              <a:t>:</a:t>
+            </a:r>
+            <a:r>
+              <a:rPr lang="en-US" sz="1200" dirty="0" err="1">
+                <a:solidFill>
+                  <a:schemeClr val="bg1"/>
+                </a:solidFill>
+              </a:rPr>
+              <a:t>VersionedAddressBook</a:t>
+            </a:r>
+            <a:endParaRPr lang="en-SG" sz="1200" dirty="0">
+              <a:solidFill>
+                <a:schemeClr val="bg1"/>
+              </a:solidFill>
+            </a:endParaRPr>
+          </a:p>
+        </p:txBody>
+      </p:sp>
       <p:cxnSp>
         <p:nvCxnSpPr>
-          <p:cNvPr id="50" name="Straight Arrow Connector 49"/>
+          <p:cNvPr id="91" name="Straight Arrow Connector 74">
+            <a:extLst>
+              <a:ext uri="{FF2B5EF4-FFF2-40B4-BE49-F238E27FC236}">
+                <a16:creationId xmlns:a16="http://schemas.microsoft.com/office/drawing/2014/main" id="{C03ABABB-0272-4C4A-9E08-568D3C87CA72}"/>
+              </a:ext>
+            </a:extLst>
+          </p:cNvPr>
           <p:cNvCxnSpPr>
             <a:cxnSpLocks/>
           </p:cNvCxnSpPr>
@@ -5271,8 +5095,8 @@
         </p:nvCxnSpPr>
         <p:spPr>
           <a:xfrm flipV="1">
-            <a:off x="2499663" y="2708960"/>
-            <a:ext cx="653044" cy="7406"/>
+            <a:off x="4092728" y="3982651"/>
+            <a:ext cx="1412140" cy="4041"/>
           </a:xfrm>
           <a:prstGeom prst="straightConnector1">
             <a:avLst/>
@@ -5299,29 +5123,179 @@
           </a:fontRef>
         </p:style>
       </p:cxnSp>
+      <p:sp>
+        <p:nvSpPr>
+          <p:cNvPr id="78" name="TextBox 77"/>
+          <p:cNvSpPr txBox="1"/>
+          <p:nvPr/>
+        </p:nvSpPr>
+        <p:spPr>
+          <a:xfrm>
+            <a:off x="5285947" y="3982650"/>
+            <a:ext cx="1424846" cy="138499"/>
+          </a:xfrm>
+          <a:prstGeom prst="rect">
+            <a:avLst/>
+          </a:prstGeom>
+          <a:noFill/>
+        </p:spPr>
+        <p:txBody>
+          <a:bodyPr wrap="square" lIns="0" tIns="0" rIns="0" bIns="0" rtlCol="0">
+            <a:spAutoFit/>
+          </a:bodyPr>
+          <a:lstStyle>
+            <a:defPPr>
+              <a:defRPr lang="en-US"/>
+            </a:defPPr>
+            <a:lvl1pPr algn="r">
+              <a:defRPr sz="1400">
+                <a:solidFill>
+                  <a:srgbClr val="0070C0"/>
+                </a:solidFill>
+              </a:defRPr>
+            </a:lvl1pPr>
+          </a:lstStyle>
+          <a:p>
+            <a:r>
+              <a:rPr lang="en-US" sz="900" dirty="0" err="1">
+                <a:solidFill>
+                  <a:srgbClr val="7030A0"/>
+                </a:solidFill>
+              </a:rPr>
+              <a:t>updatePerson</a:t>
+            </a:r>
+            <a:r>
+              <a:rPr lang="en-US" sz="900" dirty="0">
+                <a:solidFill>
+                  <a:srgbClr val="7030A0"/>
+                </a:solidFill>
+              </a:rPr>
+              <a:t>()</a:t>
+            </a:r>
+          </a:p>
+        </p:txBody>
+      </p:sp>
+      <p:sp>
+        <p:nvSpPr>
+          <p:cNvPr id="31" name="文本框 30">
+            <a:extLst>
+              <a:ext uri="{FF2B5EF4-FFF2-40B4-BE49-F238E27FC236}">
+                <a16:creationId xmlns:a16="http://schemas.microsoft.com/office/drawing/2014/main" id="{1B166261-5179-6145-975B-323EE9E07073}"/>
+              </a:ext>
+            </a:extLst>
+          </p:cNvPr>
+          <p:cNvSpPr txBox="1"/>
+          <p:nvPr/>
+        </p:nvSpPr>
+        <p:spPr>
+          <a:xfrm>
+            <a:off x="3919876" y="5183673"/>
+            <a:ext cx="229497" cy="276999"/>
+          </a:xfrm>
+          <a:prstGeom prst="rect">
+            <a:avLst/>
+          </a:prstGeom>
+          <a:noFill/>
+        </p:spPr>
+        <p:txBody>
+          <a:bodyPr wrap="square" rtlCol="0">
+            <a:spAutoFit/>
+          </a:bodyPr>
+          <a:lstStyle/>
+          <a:p>
+            <a:r>
+              <a:rPr kumimoji="1" lang="en-US" altLang="zh-CN" sz="1200" dirty="0"/>
+              <a:t>x</a:t>
+            </a:r>
+            <a:endParaRPr kumimoji="1" lang="zh-CN" altLang="en-US" sz="1200" dirty="0"/>
+          </a:p>
+        </p:txBody>
+      </p:sp>
+      <p:sp>
+        <p:nvSpPr>
+          <p:cNvPr id="92" name="TextBox 77">
+            <a:extLst>
+              <a:ext uri="{FF2B5EF4-FFF2-40B4-BE49-F238E27FC236}">
+                <a16:creationId xmlns:a16="http://schemas.microsoft.com/office/drawing/2014/main" id="{908E0C94-4DD7-9B4B-B4B1-4E8171BBD388}"/>
+              </a:ext>
+            </a:extLst>
+          </p:cNvPr>
+          <p:cNvSpPr txBox="1"/>
+          <p:nvPr/>
+        </p:nvSpPr>
+        <p:spPr>
+          <a:xfrm>
+            <a:off x="3853569" y="3808612"/>
+            <a:ext cx="1424846" cy="138499"/>
+          </a:xfrm>
+          <a:prstGeom prst="rect">
+            <a:avLst/>
+          </a:prstGeom>
+          <a:noFill/>
+        </p:spPr>
+        <p:txBody>
+          <a:bodyPr wrap="square" lIns="0" tIns="0" rIns="0" bIns="0" rtlCol="0">
+            <a:spAutoFit/>
+          </a:bodyPr>
+          <a:lstStyle>
+            <a:defPPr>
+              <a:defRPr lang="en-US"/>
+            </a:defPPr>
+            <a:lvl1pPr algn="r">
+              <a:defRPr sz="1400">
+                <a:solidFill>
+                  <a:srgbClr val="0070C0"/>
+                </a:solidFill>
+              </a:defRPr>
+            </a:lvl1pPr>
+          </a:lstStyle>
+          <a:p>
+            <a:r>
+              <a:rPr lang="en-US" sz="900" dirty="0" err="1">
+                <a:solidFill>
+                  <a:srgbClr val="7030A0"/>
+                </a:solidFill>
+              </a:rPr>
+              <a:t>updatePerson</a:t>
+            </a:r>
+            <a:r>
+              <a:rPr lang="en-US" sz="900" dirty="0">
+                <a:solidFill>
+                  <a:srgbClr val="7030A0"/>
+                </a:solidFill>
+              </a:rPr>
+              <a:t>()</a:t>
+            </a:r>
+          </a:p>
+        </p:txBody>
+      </p:sp>
       <p:cxnSp>
         <p:nvCxnSpPr>
-          <p:cNvPr id="52" name="Straight Arrow Connector 51"/>
+          <p:cNvPr id="94" name="Straight Arrow Connector 74">
+            <a:extLst>
+              <a:ext uri="{FF2B5EF4-FFF2-40B4-BE49-F238E27FC236}">
+                <a16:creationId xmlns:a16="http://schemas.microsoft.com/office/drawing/2014/main" id="{F263436B-ECEB-2842-BF86-696CE57817BF}"/>
+              </a:ext>
+            </a:extLst>
+          </p:cNvPr>
           <p:cNvCxnSpPr>
             <a:cxnSpLocks/>
           </p:cNvCxnSpPr>
           <p:nvPr/>
         </p:nvCxnSpPr>
         <p:spPr>
-          <a:xfrm>
-            <a:off x="2468443" y="3024687"/>
-            <a:ext cx="1298178" cy="12500"/>
+          <a:xfrm flipV="1">
+            <a:off x="5640364" y="4144975"/>
+            <a:ext cx="1412140" cy="4041"/>
           </a:xfrm>
           <a:prstGeom prst="straightConnector1">
             <a:avLst/>
           </a:prstGeom>
           <a:ln w="19050">
             <a:solidFill>
-              <a:srgbClr val="0070C0"/>
+              <a:srgbClr val="7030A0"/>
             </a:solidFill>
-            <a:prstDash val="sysDash"/>
-            <a:headEnd type="arrow" w="med" len="med"/>
-            <a:tailEnd type="none" w="med" len="med"/>
+            <a:tailEnd type="arrow"/>
           </a:ln>
         </p:spPr>
         <p:style>
@@ -5339,488 +5313,10 @@
           </a:fontRef>
         </p:style>
       </p:cxnSp>
-      <p:sp>
-        <p:nvSpPr>
-          <p:cNvPr id="4" name="TextBox 3"/>
-          <p:cNvSpPr txBox="1"/>
-          <p:nvPr/>
-        </p:nvSpPr>
-        <p:spPr>
-          <a:xfrm>
-            <a:off x="3741553" y="3663267"/>
-            <a:ext cx="278515" cy="261610"/>
-          </a:xfrm>
-          <a:prstGeom prst="rect">
-            <a:avLst/>
-          </a:prstGeom>
-          <a:noFill/>
-        </p:spPr>
-        <p:txBody>
-          <a:bodyPr wrap="square" rtlCol="0">
-            <a:spAutoFit/>
-          </a:bodyPr>
-          <a:lstStyle/>
-          <a:p>
-            <a:r>
-              <a:rPr lang="en-SG" sz="1100" dirty="0">
-                <a:solidFill>
-                  <a:srgbClr val="002060"/>
-                </a:solidFill>
-              </a:rPr>
-              <a:t>X</a:t>
-            </a:r>
-          </a:p>
-        </p:txBody>
-      </p:sp>
-      <p:cxnSp>
-        <p:nvCxnSpPr>
-          <p:cNvPr id="74" name="Straight Connector 70">
-            <a:extLst>
-              <a:ext uri="{FF2B5EF4-FFF2-40B4-BE49-F238E27FC236}">
-                <a16:creationId xmlns:a16="http://schemas.microsoft.com/office/drawing/2014/main" id="{3C5E4B8D-C49A-FF4C-B2DF-24E2514AB45D}"/>
-              </a:ext>
-            </a:extLst>
-          </p:cNvPr>
-          <p:cNvCxnSpPr>
-            <a:cxnSpLocks/>
-          </p:cNvCxnSpPr>
-          <p:nvPr/>
-        </p:nvCxnSpPr>
-        <p:spPr>
-          <a:xfrm>
-            <a:off x="6286336" y="3334211"/>
-            <a:ext cx="0" cy="1635994"/>
-          </a:xfrm>
-          <a:prstGeom prst="line">
-            <a:avLst/>
-          </a:prstGeom>
-          <a:ln w="19050">
-            <a:solidFill>
-              <a:schemeClr val="accent4">
-                <a:lumMod val="60000"/>
-                <a:lumOff val="40000"/>
-              </a:schemeClr>
-            </a:solidFill>
-            <a:prstDash val="sysDash"/>
-          </a:ln>
-          <a:effectLst/>
-        </p:spPr>
-        <p:style>
-          <a:lnRef idx="1">
-            <a:schemeClr val="accent1"/>
-          </a:lnRef>
-          <a:fillRef idx="2">
-            <a:schemeClr val="accent1"/>
-          </a:fillRef>
-          <a:effectRef idx="1">
-            <a:schemeClr val="accent1"/>
-          </a:effectRef>
-          <a:fontRef idx="minor">
-            <a:schemeClr val="dk1"/>
-          </a:fontRef>
-        </p:style>
-      </p:cxnSp>
-      <p:sp>
-        <p:nvSpPr>
-          <p:cNvPr id="85" name="Rectangle 72">
-            <a:extLst>
-              <a:ext uri="{FF2B5EF4-FFF2-40B4-BE49-F238E27FC236}">
-                <a16:creationId xmlns:a16="http://schemas.microsoft.com/office/drawing/2014/main" id="{3A77499D-19EC-794E-A5C5-26EFCB5ED155}"/>
-              </a:ext>
-            </a:extLst>
-          </p:cNvPr>
-          <p:cNvSpPr/>
-          <p:nvPr/>
-        </p:nvSpPr>
-        <p:spPr>
-          <a:xfrm>
-            <a:off x="6179208" y="3887158"/>
-            <a:ext cx="163540" cy="303842"/>
-          </a:xfrm>
-          <a:prstGeom prst="rect">
-            <a:avLst/>
-          </a:prstGeom>
-          <a:solidFill>
-            <a:schemeClr val="accent4">
-              <a:lumMod val="60000"/>
-              <a:lumOff val="40000"/>
-            </a:schemeClr>
-          </a:solidFill>
-          <a:ln>
-            <a:solidFill>
-              <a:schemeClr val="accent4">
-                <a:lumMod val="60000"/>
-                <a:lumOff val="40000"/>
-              </a:schemeClr>
-            </a:solidFill>
-          </a:ln>
-          <a:effectLst/>
-        </p:spPr>
-        <p:style>
-          <a:lnRef idx="1">
-            <a:schemeClr val="accent3"/>
-          </a:lnRef>
-          <a:fillRef idx="2">
-            <a:schemeClr val="accent3"/>
-          </a:fillRef>
-          <a:effectRef idx="1">
-            <a:schemeClr val="accent3"/>
-          </a:effectRef>
-          <a:fontRef idx="minor">
-            <a:schemeClr val="dk1"/>
-          </a:fontRef>
-        </p:style>
-        <p:txBody>
-          <a:bodyPr rtlCol="0" anchor="ctr"/>
-          <a:lstStyle/>
-          <a:p>
-            <a:pPr algn="ctr"/>
-            <a:endParaRPr lang="en-SG" sz="1400">
-              <a:solidFill>
-                <a:schemeClr val="dk1"/>
-              </a:solidFill>
-            </a:endParaRPr>
-          </a:p>
-        </p:txBody>
-      </p:sp>
-      <p:cxnSp>
-        <p:nvCxnSpPr>
-          <p:cNvPr id="87" name="Straight Arrow Connector 75">
-            <a:extLst>
-              <a:ext uri="{FF2B5EF4-FFF2-40B4-BE49-F238E27FC236}">
-                <a16:creationId xmlns:a16="http://schemas.microsoft.com/office/drawing/2014/main" id="{7CF7ECA5-86DB-CF42-9365-87754163FDB3}"/>
-              </a:ext>
-            </a:extLst>
-          </p:cNvPr>
-          <p:cNvCxnSpPr>
-            <a:cxnSpLocks/>
-            <a:endCxn id="85" idx="2"/>
-          </p:cNvCxnSpPr>
-          <p:nvPr/>
-        </p:nvCxnSpPr>
-        <p:spPr>
-          <a:xfrm flipV="1">
-            <a:off x="5088152" y="4191000"/>
-            <a:ext cx="1172826" cy="11922"/>
-          </a:xfrm>
-          <a:prstGeom prst="straightConnector1">
-            <a:avLst/>
-          </a:prstGeom>
-          <a:ln w="19050">
-            <a:solidFill>
-              <a:schemeClr val="accent4">
-                <a:lumMod val="60000"/>
-                <a:lumOff val="40000"/>
-              </a:schemeClr>
-            </a:solidFill>
-            <a:prstDash val="sysDash"/>
-            <a:headEnd type="arrow" w="med" len="med"/>
-            <a:tailEnd type="none" w="med" len="med"/>
-          </a:ln>
-        </p:spPr>
-        <p:style>
-          <a:lnRef idx="1">
-            <a:schemeClr val="accent1"/>
-          </a:lnRef>
-          <a:fillRef idx="0">
-            <a:schemeClr val="accent1"/>
-          </a:fillRef>
-          <a:effectRef idx="0">
-            <a:schemeClr val="accent1"/>
-          </a:effectRef>
-          <a:fontRef idx="minor">
-            <a:schemeClr val="tx1"/>
-          </a:fontRef>
-        </p:style>
-      </p:cxnSp>
-      <p:sp>
-        <p:nvSpPr>
-          <p:cNvPr id="88" name="Rectangle 62">
-            <a:extLst>
-              <a:ext uri="{FF2B5EF4-FFF2-40B4-BE49-F238E27FC236}">
-                <a16:creationId xmlns:a16="http://schemas.microsoft.com/office/drawing/2014/main" id="{F7BA9BAF-B03F-A340-B807-FCD99F49A49E}"/>
-              </a:ext>
-            </a:extLst>
-          </p:cNvPr>
-          <p:cNvSpPr/>
-          <p:nvPr/>
-        </p:nvSpPr>
-        <p:spPr>
-          <a:xfrm>
-            <a:off x="7020246" y="2716366"/>
-            <a:ext cx="653648" cy="231455"/>
-          </a:xfrm>
-          <a:prstGeom prst="rect">
-            <a:avLst/>
-          </a:prstGeom>
-          <a:solidFill>
-            <a:schemeClr val="accent4">
-              <a:lumMod val="60000"/>
-              <a:lumOff val="40000"/>
-            </a:schemeClr>
-          </a:solidFill>
-          <a:ln w="19050">
-            <a:solidFill>
-              <a:schemeClr val="accent4">
-                <a:lumMod val="60000"/>
-                <a:lumOff val="40000"/>
-              </a:schemeClr>
-            </a:solidFill>
-          </a:ln>
-          <a:effectLst/>
-        </p:spPr>
-        <p:style>
-          <a:lnRef idx="1">
-            <a:schemeClr val="accent2"/>
-          </a:lnRef>
-          <a:fillRef idx="2">
-            <a:schemeClr val="accent2"/>
-          </a:fillRef>
-          <a:effectRef idx="1">
-            <a:schemeClr val="accent2"/>
-          </a:effectRef>
-          <a:fontRef idx="minor">
-            <a:schemeClr val="dk1"/>
-          </a:fontRef>
-        </p:style>
-        <p:txBody>
-          <a:bodyPr rtlCol="0" anchor="ctr"/>
-          <a:lstStyle/>
-          <a:p>
-            <a:pPr algn="ctr"/>
-            <a:r>
-              <a:rPr lang="en-US" sz="1200" dirty="0">
-                <a:solidFill>
-                  <a:schemeClr val="bg1"/>
-                </a:solidFill>
-              </a:rPr>
-              <a:t>:Model</a:t>
-            </a:r>
-            <a:endParaRPr lang="en-SG" sz="1200" dirty="0">
-              <a:solidFill>
-                <a:schemeClr val="bg1"/>
-              </a:solidFill>
-            </a:endParaRPr>
-          </a:p>
-        </p:txBody>
-      </p:sp>
-      <p:sp>
-        <p:nvSpPr>
-          <p:cNvPr id="89" name="TextBox 77">
-            <a:extLst>
-              <a:ext uri="{FF2B5EF4-FFF2-40B4-BE49-F238E27FC236}">
-                <a16:creationId xmlns:a16="http://schemas.microsoft.com/office/drawing/2014/main" id="{093278BE-0289-F347-B6D7-0B94514EC160}"/>
-              </a:ext>
-            </a:extLst>
-          </p:cNvPr>
-          <p:cNvSpPr txBox="1"/>
-          <p:nvPr/>
-        </p:nvSpPr>
-        <p:spPr>
-          <a:xfrm rot="10800000" flipV="1">
-            <a:off x="5243464" y="4017067"/>
-            <a:ext cx="540859" cy="153888"/>
-          </a:xfrm>
-          <a:prstGeom prst="rect">
-            <a:avLst/>
-          </a:prstGeom>
-          <a:noFill/>
-        </p:spPr>
-        <p:txBody>
-          <a:bodyPr wrap="square" lIns="0" tIns="0" rIns="0" bIns="0" rtlCol="0">
-            <a:spAutoFit/>
-          </a:bodyPr>
-          <a:lstStyle>
-            <a:defPPr>
-              <a:defRPr lang="en-US"/>
-            </a:defPPr>
-            <a:lvl1pPr algn="r">
-              <a:defRPr sz="1400">
-                <a:solidFill>
-                  <a:srgbClr val="0070C0"/>
-                </a:solidFill>
-              </a:defRPr>
-            </a:lvl1pPr>
-          </a:lstStyle>
-          <a:p>
-            <a:r>
-              <a:rPr lang="en-US" sz="1000" dirty="0">
-                <a:solidFill>
-                  <a:srgbClr val="7030A0"/>
-                </a:solidFill>
-              </a:rPr>
-              <a:t>p</a:t>
-            </a:r>
-          </a:p>
-        </p:txBody>
-      </p:sp>
-      <p:cxnSp>
-        <p:nvCxnSpPr>
-          <p:cNvPr id="91" name="Straight Arrow Connector 74">
-            <a:extLst>
-              <a:ext uri="{FF2B5EF4-FFF2-40B4-BE49-F238E27FC236}">
-                <a16:creationId xmlns:a16="http://schemas.microsoft.com/office/drawing/2014/main" id="{C03ABABB-0272-4C4A-9E08-568D3C87CA72}"/>
-              </a:ext>
-            </a:extLst>
-          </p:cNvPr>
-          <p:cNvCxnSpPr>
-            <a:cxnSpLocks/>
-          </p:cNvCxnSpPr>
-          <p:nvPr/>
-        </p:nvCxnSpPr>
-        <p:spPr>
-          <a:xfrm>
-            <a:off x="5051485" y="4334846"/>
-            <a:ext cx="2202220" cy="2987"/>
-          </a:xfrm>
-          <a:prstGeom prst="straightConnector1">
-            <a:avLst/>
-          </a:prstGeom>
-          <a:ln w="19050">
-            <a:solidFill>
-              <a:srgbClr val="0070C0"/>
-            </a:solidFill>
-            <a:tailEnd type="arrow"/>
-          </a:ln>
-        </p:spPr>
-        <p:style>
-          <a:lnRef idx="1">
-            <a:schemeClr val="accent1"/>
-          </a:lnRef>
-          <a:fillRef idx="0">
-            <a:schemeClr val="accent1"/>
-          </a:fillRef>
-          <a:effectRef idx="0">
-            <a:schemeClr val="accent1"/>
-          </a:effectRef>
-          <a:fontRef idx="minor">
-            <a:schemeClr val="tx1"/>
-          </a:fontRef>
-        </p:style>
-      </p:cxnSp>
-      <p:sp>
-        <p:nvSpPr>
-          <p:cNvPr id="78" name="TextBox 77"/>
-          <p:cNvSpPr txBox="1"/>
-          <p:nvPr/>
-        </p:nvSpPr>
-        <p:spPr>
-          <a:xfrm>
-            <a:off x="5305119" y="4339030"/>
-            <a:ext cx="1424846" cy="138499"/>
-          </a:xfrm>
-          <a:prstGeom prst="rect">
-            <a:avLst/>
-          </a:prstGeom>
-          <a:noFill/>
-        </p:spPr>
-        <p:txBody>
-          <a:bodyPr wrap="square" lIns="0" tIns="0" rIns="0" bIns="0" rtlCol="0">
-            <a:spAutoFit/>
-          </a:bodyPr>
-          <a:lstStyle>
-            <a:defPPr>
-              <a:defRPr lang="en-US"/>
-            </a:defPPr>
-            <a:lvl1pPr algn="r">
-              <a:defRPr sz="1400">
-                <a:solidFill>
-                  <a:srgbClr val="0070C0"/>
-                </a:solidFill>
-              </a:defRPr>
-            </a:lvl1pPr>
-          </a:lstStyle>
-          <a:p>
-            <a:r>
-              <a:rPr lang="en-US" sz="900" dirty="0" err="1">
-                <a:solidFill>
-                  <a:srgbClr val="7030A0"/>
-                </a:solidFill>
-              </a:rPr>
-              <a:t>updateFilteredPersonList</a:t>
-            </a:r>
-            <a:r>
-              <a:rPr lang="en-US" sz="900" dirty="0">
-                <a:solidFill>
-                  <a:srgbClr val="7030A0"/>
-                </a:solidFill>
-              </a:rPr>
-              <a:t>(p)</a:t>
-            </a:r>
-          </a:p>
-        </p:txBody>
-      </p:sp>
-      <p:sp>
-        <p:nvSpPr>
-          <p:cNvPr id="84" name="Rectangle 62"/>
-          <p:cNvSpPr/>
-          <p:nvPr/>
-        </p:nvSpPr>
-        <p:spPr>
-          <a:xfrm>
-            <a:off x="5323187" y="4608294"/>
-            <a:ext cx="1244974" cy="331418"/>
-          </a:xfrm>
-          <a:prstGeom prst="rect">
-            <a:avLst/>
-          </a:prstGeom>
-          <a:solidFill>
-            <a:srgbClr val="0070C0"/>
-          </a:solidFill>
-          <a:ln w="19050">
-            <a:solidFill>
-              <a:srgbClr val="0070C0"/>
-            </a:solidFill>
-          </a:ln>
-          <a:effectLst/>
-        </p:spPr>
-        <p:style>
-          <a:lnRef idx="1">
-            <a:schemeClr val="accent2"/>
-          </a:lnRef>
-          <a:fillRef idx="2">
-            <a:schemeClr val="accent2"/>
-          </a:fillRef>
-          <a:effectRef idx="1">
-            <a:schemeClr val="accent2"/>
-          </a:effectRef>
-          <a:fontRef idx="minor">
-            <a:schemeClr val="dk1"/>
-          </a:fontRef>
-        </p:style>
-        <p:txBody>
-          <a:bodyPr rtlCol="0" anchor="ctr"/>
-          <a:lstStyle/>
-          <a:p>
-            <a:pPr algn="ctr"/>
-            <a:r>
-              <a:rPr lang="en-US" sz="1200" dirty="0" err="1">
-                <a:solidFill>
-                  <a:schemeClr val="bg1"/>
-                </a:solidFill>
-              </a:rPr>
-              <a:t>result:Command</a:t>
-            </a:r>
-            <a:r>
-              <a:rPr lang="en-US" sz="1200" dirty="0">
-                <a:solidFill>
-                  <a:schemeClr val="bg1"/>
-                </a:solidFill>
-              </a:rPr>
-              <a:t> Result</a:t>
-            </a:r>
-            <a:endParaRPr lang="en-SG" sz="1200" dirty="0">
-              <a:solidFill>
-                <a:schemeClr val="bg1"/>
-              </a:solidFill>
-            </a:endParaRPr>
-          </a:p>
-        </p:txBody>
-      </p:sp>
     </p:spTree>
     <p:extLst>
       <p:ext uri="{BB962C8B-B14F-4D97-AF65-F5344CB8AC3E}">
-        <p14:creationId xmlns:p14="http://schemas.microsoft.com/office/powerpoint/2010/main" val="2876103528"/>
+        <p14:creationId xmlns:p14="http://schemas.microsoft.com/office/powerpoint/2010/main" val="2975639299"/>
       </p:ext>
     </p:extLst>
   </p:cSld>

</xml_diff>

<commit_message>
Update DeveloperGuide.adoc and add sequence diagrams for several commands
</commit_message>
<xml_diff>
--- a/docs/diagrams/AddMedicalHistorySequenceDiagram.pptx
+++ b/docs/diagrams/AddMedicalHistorySequenceDiagram.pptx
@@ -208,7 +208,7 @@
           <a:p>
             <a:fld id="{F5CC4B3F-88C1-4FFA-B1B6-F41C21DC6924}" type="datetimeFigureOut">
               <a:rPr lang="en-US" smtClean="0"/>
-              <a:t>10/24/18</a:t>
+              <a:t>11/11/2018</a:t>
             </a:fld>
             <a:endParaRPr lang="en-US"/>
           </a:p>
@@ -654,7 +654,7 @@
           <a:p>
             <a:fld id="{78C97017-6FC3-485B-9764-EAC9E56C1D49}" type="datetimeFigureOut">
               <a:rPr lang="en-US" smtClean="0"/>
-              <a:t>10/24/18</a:t>
+              <a:t>11/11/2018</a:t>
             </a:fld>
             <a:endParaRPr lang="en-US"/>
           </a:p>
@@ -822,7 +822,7 @@
           <a:p>
             <a:fld id="{78C97017-6FC3-485B-9764-EAC9E56C1D49}" type="datetimeFigureOut">
               <a:rPr lang="en-US" smtClean="0"/>
-              <a:t>10/24/18</a:t>
+              <a:t>11/11/2018</a:t>
             </a:fld>
             <a:endParaRPr lang="en-US"/>
           </a:p>
@@ -1000,7 +1000,7 @@
           <a:p>
             <a:fld id="{78C97017-6FC3-485B-9764-EAC9E56C1D49}" type="datetimeFigureOut">
               <a:rPr lang="en-US" smtClean="0"/>
-              <a:t>10/24/18</a:t>
+              <a:t>11/11/2018</a:t>
             </a:fld>
             <a:endParaRPr lang="en-US"/>
           </a:p>
@@ -1168,7 +1168,7 @@
           <a:p>
             <a:fld id="{78C97017-6FC3-485B-9764-EAC9E56C1D49}" type="datetimeFigureOut">
               <a:rPr lang="en-US" smtClean="0"/>
-              <a:t>10/24/18</a:t>
+              <a:t>11/11/2018</a:t>
             </a:fld>
             <a:endParaRPr lang="en-US"/>
           </a:p>
@@ -1413,7 +1413,7 @@
           <a:p>
             <a:fld id="{78C97017-6FC3-485B-9764-EAC9E56C1D49}" type="datetimeFigureOut">
               <a:rPr lang="en-US" smtClean="0"/>
-              <a:t>10/24/18</a:t>
+              <a:t>11/11/2018</a:t>
             </a:fld>
             <a:endParaRPr lang="en-US"/>
           </a:p>
@@ -1698,7 +1698,7 @@
           <a:p>
             <a:fld id="{78C97017-6FC3-485B-9764-EAC9E56C1D49}" type="datetimeFigureOut">
               <a:rPr lang="en-US" smtClean="0"/>
-              <a:t>10/24/18</a:t>
+              <a:t>11/11/2018</a:t>
             </a:fld>
             <a:endParaRPr lang="en-US"/>
           </a:p>
@@ -2117,7 +2117,7 @@
           <a:p>
             <a:fld id="{78C97017-6FC3-485B-9764-EAC9E56C1D49}" type="datetimeFigureOut">
               <a:rPr lang="en-US" smtClean="0"/>
-              <a:t>10/24/18</a:t>
+              <a:t>11/11/2018</a:t>
             </a:fld>
             <a:endParaRPr lang="en-US"/>
           </a:p>
@@ -2234,7 +2234,7 @@
           <a:p>
             <a:fld id="{78C97017-6FC3-485B-9764-EAC9E56C1D49}" type="datetimeFigureOut">
               <a:rPr lang="en-US" smtClean="0"/>
-              <a:t>10/24/18</a:t>
+              <a:t>11/11/2018</a:t>
             </a:fld>
             <a:endParaRPr lang="en-US"/>
           </a:p>
@@ -2329,7 +2329,7 @@
           <a:p>
             <a:fld id="{78C97017-6FC3-485B-9764-EAC9E56C1D49}" type="datetimeFigureOut">
               <a:rPr lang="en-US" smtClean="0"/>
-              <a:t>10/24/18</a:t>
+              <a:t>11/11/2018</a:t>
             </a:fld>
             <a:endParaRPr lang="en-US"/>
           </a:p>
@@ -2604,7 +2604,7 @@
           <a:p>
             <a:fld id="{78C97017-6FC3-485B-9764-EAC9E56C1D49}" type="datetimeFigureOut">
               <a:rPr lang="en-US" smtClean="0"/>
-              <a:t>10/24/18</a:t>
+              <a:t>11/11/2018</a:t>
             </a:fld>
             <a:endParaRPr lang="en-US"/>
           </a:p>
@@ -2856,7 +2856,7 @@
           <a:p>
             <a:fld id="{78C97017-6FC3-485B-9764-EAC9E56C1D49}" type="datetimeFigureOut">
               <a:rPr lang="en-US" smtClean="0"/>
-              <a:t>10/24/18</a:t>
+              <a:t>11/11/2018</a:t>
             </a:fld>
             <a:endParaRPr lang="en-US"/>
           </a:p>
@@ -3067,7 +3067,7 @@
           <a:p>
             <a:fld id="{78C97017-6FC3-485B-9764-EAC9E56C1D49}" type="datetimeFigureOut">
               <a:rPr lang="en-US" smtClean="0"/>
-              <a:t>10/24/18</a:t>
+              <a:t>11/11/2018</a:t>
             </a:fld>
             <a:endParaRPr lang="en-US"/>
           </a:p>
@@ -3444,10 +3444,10 @@
       </p:grpSpPr>
       <p:sp>
         <p:nvSpPr>
-          <p:cNvPr id="66" name="Rectangle 65">
+          <p:cNvPr id="53" name="Rectangle 65">
             <a:extLst>
               <a:ext uri="{FF2B5EF4-FFF2-40B4-BE49-F238E27FC236}">
-                <a16:creationId xmlns:a16="http://schemas.microsoft.com/office/drawing/2014/main" id="{977AFC49-CE5E-FB4D-8347-107895882ED4}"/>
+                <a16:creationId xmlns:a16="http://schemas.microsoft.com/office/drawing/2014/main" id="{50918D4A-1A44-4D90-89F4-ABF4F8D7CB5C}"/>
               </a:ext>
             </a:extLst>
           </p:cNvPr>
@@ -3506,7 +3506,13 @@
       </p:sp>
       <p:sp>
         <p:nvSpPr>
-          <p:cNvPr id="81" name="Rectangle 65"/>
+          <p:cNvPr id="54" name="Rectangle 65">
+            <a:extLst>
+              <a:ext uri="{FF2B5EF4-FFF2-40B4-BE49-F238E27FC236}">
+                <a16:creationId xmlns:a16="http://schemas.microsoft.com/office/drawing/2014/main" id="{2358B367-4AEE-4804-924E-DCD37E8E092D}"/>
+              </a:ext>
+            </a:extLst>
+          </p:cNvPr>
           <p:cNvSpPr/>
           <p:nvPr/>
         </p:nvSpPr>
@@ -3567,7 +3573,13 @@
       </p:sp>
       <p:sp>
         <p:nvSpPr>
-          <p:cNvPr id="2" name="Rectangle 62"/>
+          <p:cNvPr id="55" name="Rectangle 62">
+            <a:extLst>
+              <a:ext uri="{FF2B5EF4-FFF2-40B4-BE49-F238E27FC236}">
+                <a16:creationId xmlns:a16="http://schemas.microsoft.com/office/drawing/2014/main" id="{C445022C-A51A-4175-B669-A22F9F011BAD}"/>
+              </a:ext>
+            </a:extLst>
+          </p:cNvPr>
           <p:cNvSpPr/>
           <p:nvPr/>
         </p:nvSpPr>
@@ -3634,7 +3646,13 @@
       </p:sp>
       <p:cxnSp>
         <p:nvCxnSpPr>
-          <p:cNvPr id="5" name="Straight Connector 4"/>
+          <p:cNvPr id="56" name="Straight Connector 55">
+            <a:extLst>
+              <a:ext uri="{FF2B5EF4-FFF2-40B4-BE49-F238E27FC236}">
+                <a16:creationId xmlns:a16="http://schemas.microsoft.com/office/drawing/2014/main" id="{CFF8D616-FF4C-419D-9093-2DDC23498FB0}"/>
+              </a:ext>
+            </a:extLst>
+          </p:cNvPr>
           <p:cNvCxnSpPr>
             <a:cxnSpLocks/>
           </p:cNvCxnSpPr>
@@ -3673,7 +3691,13 @@
       </p:cxnSp>
       <p:sp>
         <p:nvSpPr>
-          <p:cNvPr id="6" name="Rectangle 5"/>
+          <p:cNvPr id="57" name="Rectangle 56">
+            <a:extLst>
+              <a:ext uri="{FF2B5EF4-FFF2-40B4-BE49-F238E27FC236}">
+                <a16:creationId xmlns:a16="http://schemas.microsoft.com/office/drawing/2014/main" id="{DA24105E-A3BE-46C5-87FD-6647B199ACC7}"/>
+              </a:ext>
+            </a:extLst>
+          </p:cNvPr>
           <p:cNvSpPr/>
           <p:nvPr/>
         </p:nvSpPr>
@@ -3720,7 +3744,13 @@
       </p:sp>
       <p:sp>
         <p:nvSpPr>
-          <p:cNvPr id="16" name="Rectangle 62"/>
+          <p:cNvPr id="58" name="Rectangle 62">
+            <a:extLst>
+              <a:ext uri="{FF2B5EF4-FFF2-40B4-BE49-F238E27FC236}">
+                <a16:creationId xmlns:a16="http://schemas.microsoft.com/office/drawing/2014/main" id="{3ABA92AA-A579-4BFB-A787-9170C1387EF0}"/>
+              </a:ext>
+            </a:extLst>
+          </p:cNvPr>
           <p:cNvSpPr/>
           <p:nvPr/>
         </p:nvSpPr>
@@ -3790,7 +3820,13 @@
       </p:sp>
       <p:cxnSp>
         <p:nvCxnSpPr>
-          <p:cNvPr id="17" name="Straight Connector 16"/>
+          <p:cNvPr id="59" name="Straight Connector 58">
+            <a:extLst>
+              <a:ext uri="{FF2B5EF4-FFF2-40B4-BE49-F238E27FC236}">
+                <a16:creationId xmlns:a16="http://schemas.microsoft.com/office/drawing/2014/main" id="{E81EEA43-F430-4929-97AC-0522AF0BC7D7}"/>
+              </a:ext>
+            </a:extLst>
+          </p:cNvPr>
           <p:cNvCxnSpPr>
             <a:cxnSpLocks/>
           </p:cNvCxnSpPr>
@@ -3829,7 +3865,13 @@
       </p:cxnSp>
       <p:sp>
         <p:nvSpPr>
-          <p:cNvPr id="18" name="Rectangle 17"/>
+          <p:cNvPr id="60" name="Rectangle 59">
+            <a:extLst>
+              <a:ext uri="{FF2B5EF4-FFF2-40B4-BE49-F238E27FC236}">
+                <a16:creationId xmlns:a16="http://schemas.microsoft.com/office/drawing/2014/main" id="{8326DE1E-E365-423C-A695-125D92983AAB}"/>
+              </a:ext>
+            </a:extLst>
+          </p:cNvPr>
           <p:cNvSpPr/>
           <p:nvPr/>
         </p:nvSpPr>
@@ -3880,14 +3922,20 @@
       </p:sp>
       <p:sp>
         <p:nvSpPr>
-          <p:cNvPr id="19" name="Rectangle 62"/>
+          <p:cNvPr id="61" name="Rectangle 62">
+            <a:extLst>
+              <a:ext uri="{FF2B5EF4-FFF2-40B4-BE49-F238E27FC236}">
+                <a16:creationId xmlns:a16="http://schemas.microsoft.com/office/drawing/2014/main" id="{F6E47072-A884-4A0F-8AAA-7D757D745E7B}"/>
+              </a:ext>
+            </a:extLst>
+          </p:cNvPr>
           <p:cNvSpPr/>
           <p:nvPr/>
         </p:nvSpPr>
         <p:spPr>
           <a:xfrm>
-            <a:off x="4628202" y="2731829"/>
-            <a:ext cx="1129245" cy="502700"/>
+            <a:off x="4628203" y="2697038"/>
+            <a:ext cx="856850" cy="519412"/>
           </a:xfrm>
           <a:prstGeom prst="rect">
             <a:avLst/>
@@ -3927,7 +3975,7 @@
                   <a:schemeClr val="bg1"/>
                 </a:solidFill>
               </a:rPr>
-              <a:t>d:FilterPatient</a:t>
+              <a:t>d:AddMedicalHistory</a:t>
             </a:r>
             <a:br>
               <a:rPr lang="en-US" sz="1200" dirty="0">
@@ -3954,10 +4002,16 @@
       </p:sp>
       <p:cxnSp>
         <p:nvCxnSpPr>
-          <p:cNvPr id="20" name="Straight Connector 19"/>
+          <p:cNvPr id="62" name="Straight Connector 61">
+            <a:extLst>
+              <a:ext uri="{FF2B5EF4-FFF2-40B4-BE49-F238E27FC236}">
+                <a16:creationId xmlns:a16="http://schemas.microsoft.com/office/drawing/2014/main" id="{19FC84E4-9730-4D25-8AB2-F8DA73CB0F0A}"/>
+              </a:ext>
+            </a:extLst>
+          </p:cNvPr>
           <p:cNvCxnSpPr>
             <a:cxnSpLocks/>
-            <a:stCxn id="21" idx="0"/>
+            <a:stCxn id="63" idx="0"/>
           </p:cNvCxnSpPr>
           <p:nvPr/>
         </p:nvCxnSpPr>
@@ -3994,7 +4048,13 @@
       </p:cxnSp>
       <p:sp>
         <p:nvSpPr>
-          <p:cNvPr id="21" name="Rectangle 20"/>
+          <p:cNvPr id="63" name="Rectangle 62">
+            <a:extLst>
+              <a:ext uri="{FF2B5EF4-FFF2-40B4-BE49-F238E27FC236}">
+                <a16:creationId xmlns:a16="http://schemas.microsoft.com/office/drawing/2014/main" id="{4F94CCC9-9321-45B4-8212-38A6652E7452}"/>
+              </a:ext>
+            </a:extLst>
+          </p:cNvPr>
           <p:cNvSpPr/>
           <p:nvPr/>
         </p:nvSpPr>
@@ -4041,7 +4101,13 @@
       </p:sp>
       <p:cxnSp>
         <p:nvCxnSpPr>
-          <p:cNvPr id="23" name="Straight Arrow Connector 22"/>
+          <p:cNvPr id="67" name="Straight Arrow Connector 66">
+            <a:extLst>
+              <a:ext uri="{FF2B5EF4-FFF2-40B4-BE49-F238E27FC236}">
+                <a16:creationId xmlns:a16="http://schemas.microsoft.com/office/drawing/2014/main" id="{47B92AFA-2624-40AD-A741-C31DF711FB59}"/>
+              </a:ext>
+            </a:extLst>
+          </p:cNvPr>
           <p:cNvCxnSpPr>
             <a:cxnSpLocks/>
           </p:cNvCxnSpPr>
@@ -4079,7 +4145,13 @@
       </p:cxnSp>
       <p:cxnSp>
         <p:nvCxnSpPr>
-          <p:cNvPr id="25" name="Straight Arrow Connector 24"/>
+          <p:cNvPr id="68" name="Straight Arrow Connector 67">
+            <a:extLst>
+              <a:ext uri="{FF2B5EF4-FFF2-40B4-BE49-F238E27FC236}">
+                <a16:creationId xmlns:a16="http://schemas.microsoft.com/office/drawing/2014/main" id="{5FA2B271-8CEB-41BB-85F6-5A78D378798F}"/>
+              </a:ext>
+            </a:extLst>
+          </p:cNvPr>
           <p:cNvCxnSpPr>
             <a:cxnSpLocks/>
           </p:cNvCxnSpPr>
@@ -4117,14 +4189,20 @@
       </p:cxnSp>
       <p:sp>
         <p:nvSpPr>
-          <p:cNvPr id="26" name="TextBox 25"/>
+          <p:cNvPr id="69" name="TextBox 68">
+            <a:extLst>
+              <a:ext uri="{FF2B5EF4-FFF2-40B4-BE49-F238E27FC236}">
+                <a16:creationId xmlns:a16="http://schemas.microsoft.com/office/drawing/2014/main" id="{DF621B40-6ECE-42E1-867F-0F57571DE3C5}"/>
+              </a:ext>
+            </a:extLst>
+          </p:cNvPr>
           <p:cNvSpPr txBox="1"/>
           <p:nvPr/>
         </p:nvSpPr>
         <p:spPr>
           <a:xfrm>
             <a:off x="-18663" y="2546133"/>
-            <a:ext cx="1028758" cy="276999"/>
+            <a:ext cx="1028758" cy="415498"/>
           </a:xfrm>
           <a:prstGeom prst="rect">
             <a:avLst/>
@@ -4155,14 +4233,55 @@
                   <a:srgbClr val="0070C0"/>
                 </a:solidFill>
               </a:rPr>
-              <a:t>(“filter-patient”)</a:t>
+              <a:t>(“add-medical-history</a:t>
+            </a:r>
+          </a:p>
+          <a:p>
+            <a:pPr algn="r"/>
+            <a:r>
+              <a:rPr lang="en-US" altLang="zh-Hans" sz="900" dirty="0">
+                <a:solidFill>
+                  <a:srgbClr val="0070C0"/>
+                </a:solidFill>
+              </a:rPr>
+              <a:t>1</a:t>
+            </a:r>
+            <a:r>
+              <a:rPr lang="zh-Hans" altLang="en-US" sz="900" dirty="0">
+                <a:solidFill>
+                  <a:srgbClr val="0070C0"/>
+                </a:solidFill>
+              </a:rPr>
+              <a:t> </a:t>
+            </a:r>
+            <a:r>
+              <a:rPr lang="en-US" altLang="zh-Hans" sz="900" dirty="0">
+                <a:solidFill>
+                  <a:srgbClr val="0070C0"/>
+                </a:solidFill>
+              </a:rPr>
+              <a:t>al/milk  c/healthy</a:t>
+            </a:r>
+            <a:r>
+              <a:rPr lang="en-US" sz="900" dirty="0">
+                <a:solidFill>
+                  <a:srgbClr val="0070C0"/>
+                </a:solidFill>
+              </a:rPr>
+              <a:t>”)</a:t>
             </a:r>
           </a:p>
         </p:txBody>
       </p:sp>
       <p:cxnSp>
         <p:nvCxnSpPr>
-          <p:cNvPr id="28" name="Straight Arrow Connector 27"/>
+          <p:cNvPr id="70" name="Straight Arrow Connector 69">
+            <a:extLst>
+              <a:ext uri="{FF2B5EF4-FFF2-40B4-BE49-F238E27FC236}">
+                <a16:creationId xmlns:a16="http://schemas.microsoft.com/office/drawing/2014/main" id="{2A3EB937-0AB6-4900-9087-BD3ACEE7D337}"/>
+              </a:ext>
+            </a:extLst>
+          </p:cNvPr>
           <p:cNvCxnSpPr>
             <a:cxnSpLocks/>
           </p:cNvCxnSpPr>
@@ -4200,7 +4319,13 @@
       </p:cxnSp>
       <p:sp>
         <p:nvSpPr>
-          <p:cNvPr id="29" name="TextBox 28"/>
+          <p:cNvPr id="72" name="TextBox 71">
+            <a:extLst>
+              <a:ext uri="{FF2B5EF4-FFF2-40B4-BE49-F238E27FC236}">
+                <a16:creationId xmlns:a16="http://schemas.microsoft.com/office/drawing/2014/main" id="{D9490751-A5EB-4D89-85DC-8D992036E44B}"/>
+              </a:ext>
+            </a:extLst>
+          </p:cNvPr>
           <p:cNvSpPr txBox="1"/>
           <p:nvPr/>
         </p:nvSpPr>
@@ -4240,10 +4365,16 @@
       </p:sp>
       <p:cxnSp>
         <p:nvCxnSpPr>
-          <p:cNvPr id="34" name="Straight Arrow Connector 33"/>
+          <p:cNvPr id="79" name="Straight Arrow Connector 78">
+            <a:extLst>
+              <a:ext uri="{FF2B5EF4-FFF2-40B4-BE49-F238E27FC236}">
+                <a16:creationId xmlns:a16="http://schemas.microsoft.com/office/drawing/2014/main" id="{49E58AD3-4270-4245-9D0F-589625BD2F36}"/>
+              </a:ext>
+            </a:extLst>
+          </p:cNvPr>
           <p:cNvCxnSpPr>
             <a:cxnSpLocks/>
-            <a:endCxn id="21" idx="2"/>
+            <a:endCxn id="63" idx="2"/>
           </p:cNvCxnSpPr>
           <p:nvPr/>
         </p:nvCxnSpPr>
@@ -4281,7 +4412,13 @@
       </p:cxnSp>
       <p:cxnSp>
         <p:nvCxnSpPr>
-          <p:cNvPr id="35" name="Straight Arrow Connector 34"/>
+          <p:cNvPr id="80" name="Straight Arrow Connector 79">
+            <a:extLst>
+              <a:ext uri="{FF2B5EF4-FFF2-40B4-BE49-F238E27FC236}">
+                <a16:creationId xmlns:a16="http://schemas.microsoft.com/office/drawing/2014/main" id="{2E791F1A-B87A-40E2-A422-5EB35FD661FA}"/>
+              </a:ext>
+            </a:extLst>
+          </p:cNvPr>
           <p:cNvCxnSpPr>
             <a:cxnSpLocks/>
           </p:cNvCxnSpPr>
@@ -4321,7 +4458,13 @@
       </p:cxnSp>
       <p:cxnSp>
         <p:nvCxnSpPr>
-          <p:cNvPr id="37" name="Straight Arrow Connector 36"/>
+          <p:cNvPr id="92" name="Straight Arrow Connector 91">
+            <a:extLst>
+              <a:ext uri="{FF2B5EF4-FFF2-40B4-BE49-F238E27FC236}">
+                <a16:creationId xmlns:a16="http://schemas.microsoft.com/office/drawing/2014/main" id="{2F195C1D-4429-4C51-B57D-AB15B6C8D83B}"/>
+              </a:ext>
+            </a:extLst>
+          </p:cNvPr>
           <p:cNvCxnSpPr>
             <a:cxnSpLocks/>
           </p:cNvCxnSpPr>
@@ -4361,14 +4504,20 @@
       </p:cxnSp>
       <p:sp>
         <p:nvSpPr>
-          <p:cNvPr id="39" name="Rectangle 62"/>
+          <p:cNvPr id="94" name="Rectangle 62">
+            <a:extLst>
+              <a:ext uri="{FF2B5EF4-FFF2-40B4-BE49-F238E27FC236}">
+                <a16:creationId xmlns:a16="http://schemas.microsoft.com/office/drawing/2014/main" id="{C7412283-607C-4A18-A519-961B326AA451}"/>
+              </a:ext>
+            </a:extLst>
+          </p:cNvPr>
           <p:cNvSpPr/>
           <p:nvPr/>
         </p:nvSpPr>
         <p:spPr>
           <a:xfrm>
-            <a:off x="5853451" y="2857049"/>
-            <a:ext cx="1082085" cy="474476"/>
+            <a:off x="5924175" y="3095802"/>
+            <a:ext cx="802576" cy="238408"/>
           </a:xfrm>
           <a:prstGeom prst="rect">
             <a:avLst/>
@@ -4414,7 +4563,7 @@
                   <a:schemeClr val="bg1"/>
                 </a:solidFill>
               </a:rPr>
-              <a:t>p:TagContainsPatientPredicate</a:t>
+              <a:t>q:Patient</a:t>
             </a:r>
             <a:endParaRPr lang="en-SG" sz="1200" dirty="0">
               <a:solidFill>
@@ -4426,7 +4575,13 @@
       </p:sp>
       <p:cxnSp>
         <p:nvCxnSpPr>
-          <p:cNvPr id="64" name="Straight Arrow Connector 63"/>
+          <p:cNvPr id="95" name="Straight Arrow Connector 94">
+            <a:extLst>
+              <a:ext uri="{FF2B5EF4-FFF2-40B4-BE49-F238E27FC236}">
+                <a16:creationId xmlns:a16="http://schemas.microsoft.com/office/drawing/2014/main" id="{872A0238-EB87-4DB9-BD50-CFFB973A55A0}"/>
+              </a:ext>
+            </a:extLst>
+          </p:cNvPr>
           <p:cNvCxnSpPr>
             <a:cxnSpLocks/>
           </p:cNvCxnSpPr>
@@ -4464,7 +4619,13 @@
       </p:cxnSp>
       <p:sp>
         <p:nvSpPr>
-          <p:cNvPr id="65" name="Rectangle 64"/>
+          <p:cNvPr id="96" name="Rectangle 95">
+            <a:extLst>
+              <a:ext uri="{FF2B5EF4-FFF2-40B4-BE49-F238E27FC236}">
+                <a16:creationId xmlns:a16="http://schemas.microsoft.com/office/drawing/2014/main" id="{A88F2957-31BC-4D7C-B880-CDB0D495CADF}"/>
+              </a:ext>
+            </a:extLst>
+          </p:cNvPr>
           <p:cNvSpPr/>
           <p:nvPr/>
         </p:nvSpPr>
@@ -4511,7 +4672,13 @@
       </p:sp>
       <p:cxnSp>
         <p:nvCxnSpPr>
-          <p:cNvPr id="71" name="Straight Connector 70"/>
+          <p:cNvPr id="97" name="Straight Connector 96">
+            <a:extLst>
+              <a:ext uri="{FF2B5EF4-FFF2-40B4-BE49-F238E27FC236}">
+                <a16:creationId xmlns:a16="http://schemas.microsoft.com/office/drawing/2014/main" id="{21D89431-AB97-4148-B313-0AA33481487C}"/>
+              </a:ext>
+            </a:extLst>
+          </p:cNvPr>
           <p:cNvCxnSpPr>
             <a:cxnSpLocks/>
           </p:cNvCxnSpPr>
@@ -4553,7 +4720,13 @@
       </p:cxnSp>
       <p:sp>
         <p:nvSpPr>
-          <p:cNvPr id="73" name="Rectangle 72"/>
+          <p:cNvPr id="98" name="Rectangle 97">
+            <a:extLst>
+              <a:ext uri="{FF2B5EF4-FFF2-40B4-BE49-F238E27FC236}">
+                <a16:creationId xmlns:a16="http://schemas.microsoft.com/office/drawing/2014/main" id="{9468D507-F097-4B35-BC5E-CB8F7424DB09}"/>
+              </a:ext>
+            </a:extLst>
+          </p:cNvPr>
           <p:cNvSpPr/>
           <p:nvPr/>
         </p:nvSpPr>
@@ -4610,7 +4783,13 @@
       </p:sp>
       <p:cxnSp>
         <p:nvCxnSpPr>
-          <p:cNvPr id="75" name="Straight Arrow Connector 74"/>
+          <p:cNvPr id="99" name="Straight Arrow Connector 98">
+            <a:extLst>
+              <a:ext uri="{FF2B5EF4-FFF2-40B4-BE49-F238E27FC236}">
+                <a16:creationId xmlns:a16="http://schemas.microsoft.com/office/drawing/2014/main" id="{A21EE026-1732-49CB-8D2B-F519D01CE7D9}"/>
+              </a:ext>
+            </a:extLst>
+          </p:cNvPr>
           <p:cNvCxnSpPr>
             <a:cxnSpLocks/>
           </p:cNvCxnSpPr>
@@ -4648,10 +4827,16 @@
       </p:cxnSp>
       <p:cxnSp>
         <p:nvCxnSpPr>
-          <p:cNvPr id="76" name="Straight Arrow Connector 75"/>
+          <p:cNvPr id="100" name="Straight Arrow Connector 99">
+            <a:extLst>
+              <a:ext uri="{FF2B5EF4-FFF2-40B4-BE49-F238E27FC236}">
+                <a16:creationId xmlns:a16="http://schemas.microsoft.com/office/drawing/2014/main" id="{235016D3-E6AE-46CD-99AD-A653DC323AF6}"/>
+              </a:ext>
+            </a:extLst>
+          </p:cNvPr>
           <p:cNvCxnSpPr>
             <a:cxnSpLocks/>
-            <a:endCxn id="73" idx="2"/>
+            <a:endCxn id="98" idx="2"/>
           </p:cNvCxnSpPr>
           <p:nvPr/>
         </p:nvCxnSpPr>
@@ -4692,7 +4877,13 @@
       </p:cxnSp>
       <p:cxnSp>
         <p:nvCxnSpPr>
-          <p:cNvPr id="77" name="Straight Arrow Connector 76"/>
+          <p:cNvPr id="101" name="Straight Arrow Connector 100">
+            <a:extLst>
+              <a:ext uri="{FF2B5EF4-FFF2-40B4-BE49-F238E27FC236}">
+                <a16:creationId xmlns:a16="http://schemas.microsoft.com/office/drawing/2014/main" id="{99025DD8-CDC9-4B1A-8E8B-C744ABD4013B}"/>
+              </a:ext>
+            </a:extLst>
+          </p:cNvPr>
           <p:cNvCxnSpPr>
             <a:cxnSpLocks/>
           </p:cNvCxnSpPr>
@@ -4732,14 +4923,20 @@
       </p:cxnSp>
       <p:sp>
         <p:nvSpPr>
-          <p:cNvPr id="82" name="TextBox 81"/>
+          <p:cNvPr id="102" name="TextBox 101">
+            <a:extLst>
+              <a:ext uri="{FF2B5EF4-FFF2-40B4-BE49-F238E27FC236}">
+                <a16:creationId xmlns:a16="http://schemas.microsoft.com/office/drawing/2014/main" id="{E1AD6D21-74AE-4616-ADFB-355BEC7DE3F5}"/>
+              </a:ext>
+            </a:extLst>
+          </p:cNvPr>
           <p:cNvSpPr txBox="1"/>
           <p:nvPr/>
         </p:nvSpPr>
         <p:spPr>
           <a:xfrm>
-            <a:off x="2654692" y="4906798"/>
-            <a:ext cx="621216" cy="153888"/>
+            <a:off x="2051894" y="3287391"/>
+            <a:ext cx="1773145" cy="138499"/>
           </a:xfrm>
           <a:prstGeom prst="rect">
             <a:avLst/>
@@ -4764,22 +4961,28 @@
           </a:lstStyle>
           <a:p>
             <a:r>
-              <a:rPr lang="en-US" sz="1000" dirty="0"/>
-              <a:t>result</a:t>
-            </a:r>
-          </a:p>
-        </p:txBody>
-      </p:sp>
-      <p:sp>
-        <p:nvSpPr>
-          <p:cNvPr id="83" name="TextBox 82"/>
+              <a:rPr lang="en-US" sz="900" dirty="0"/>
+              <a:t>parse(“1 al/milk  c/healthy”)</a:t>
+            </a:r>
+          </a:p>
+        </p:txBody>
+      </p:sp>
+      <p:sp>
+        <p:nvSpPr>
+          <p:cNvPr id="103" name="TextBox 102">
+            <a:extLst>
+              <a:ext uri="{FF2B5EF4-FFF2-40B4-BE49-F238E27FC236}">
+                <a16:creationId xmlns:a16="http://schemas.microsoft.com/office/drawing/2014/main" id="{468E2A7C-D344-4ED0-9AC6-45985B380E78}"/>
+              </a:ext>
+            </a:extLst>
+          </p:cNvPr>
           <p:cNvSpPr txBox="1"/>
           <p:nvPr/>
         </p:nvSpPr>
         <p:spPr>
           <a:xfrm>
-            <a:off x="-87651" y="5065670"/>
-            <a:ext cx="762000" cy="138499"/>
+            <a:off x="604258" y="2687772"/>
+            <a:ext cx="1596780" cy="446276"/>
           </a:xfrm>
           <a:prstGeom prst="rect">
             <a:avLst/>
@@ -4805,106 +5008,55 @@
           <a:p>
             <a:r>
               <a:rPr lang="en-US" sz="900" dirty="0"/>
-              <a:t>result</a:t>
-            </a:r>
-          </a:p>
-        </p:txBody>
-      </p:sp>
-      <p:sp>
-        <p:nvSpPr>
-          <p:cNvPr id="86" name="Rectangle 85"/>
-          <p:cNvSpPr/>
-          <p:nvPr/>
-        </p:nvSpPr>
-        <p:spPr>
-          <a:xfrm>
-            <a:off x="5948363" y="4956638"/>
-            <a:ext cx="152400" cy="171376"/>
-          </a:xfrm>
-          <a:prstGeom prst="rect">
-            <a:avLst/>
-          </a:prstGeom>
-          <a:solidFill>
-            <a:srgbClr val="0070C0"/>
-          </a:solidFill>
-          <a:ln>
-            <a:solidFill>
-              <a:srgbClr val="0070C0"/>
-            </a:solidFill>
-          </a:ln>
-          <a:effectLst/>
-        </p:spPr>
-        <p:style>
-          <a:lnRef idx="1">
-            <a:schemeClr val="accent3"/>
-          </a:lnRef>
-          <a:fillRef idx="2">
-            <a:schemeClr val="accent3"/>
-          </a:fillRef>
-          <a:effectRef idx="1">
-            <a:schemeClr val="accent3"/>
-          </a:effectRef>
-          <a:fontRef idx="minor">
-            <a:schemeClr val="dk1"/>
-          </a:fontRef>
-        </p:style>
-        <p:txBody>
-          <a:bodyPr rtlCol="0" anchor="ctr"/>
-          <a:lstStyle/>
-          <a:p>
-            <a:pPr algn="ctr"/>
-            <a:endParaRPr lang="en-SG" sz="1400"/>
-          </a:p>
-        </p:txBody>
-      </p:sp>
-      <p:cxnSp>
-        <p:nvCxnSpPr>
-          <p:cNvPr id="90" name="Straight Arrow Connector 89"/>
-          <p:cNvCxnSpPr/>
-          <p:nvPr/>
-        </p:nvCxnSpPr>
-        <p:spPr>
-          <a:xfrm>
-            <a:off x="5120737" y="5099949"/>
-            <a:ext cx="966624" cy="0"/>
-          </a:xfrm>
-          <a:prstGeom prst="straightConnector1">
-            <a:avLst/>
-          </a:prstGeom>
-          <a:ln w="19050">
-            <a:solidFill>
-              <a:srgbClr val="0070C0"/>
-            </a:solidFill>
-            <a:prstDash val="sysDash"/>
-            <a:headEnd type="arrow" w="med" len="med"/>
-            <a:tailEnd type="none" w="med" len="med"/>
-          </a:ln>
-        </p:spPr>
-        <p:style>
-          <a:lnRef idx="1">
-            <a:schemeClr val="accent1"/>
-          </a:lnRef>
-          <a:fillRef idx="0">
-            <a:schemeClr val="accent1"/>
-          </a:fillRef>
-          <a:effectRef idx="0">
-            <a:schemeClr val="accent1"/>
-          </a:effectRef>
-          <a:fontRef idx="minor">
-            <a:schemeClr val="tx1"/>
-          </a:fontRef>
-        </p:style>
-      </p:cxnSp>
-      <p:sp>
-        <p:nvSpPr>
-          <p:cNvPr id="93" name="TextBox 92"/>
+              <a:t>parse</a:t>
+            </a:r>
+          </a:p>
+          <a:p>
+            <a:r>
+              <a:rPr lang="en-US" sz="900" dirty="0"/>
+              <a:t>(“</a:t>
+            </a:r>
+            <a:r>
+              <a:rPr lang="en-US" altLang="zh-CN" sz="900" dirty="0"/>
+              <a:t>add-medical-history</a:t>
+            </a:r>
+          </a:p>
+          <a:p>
+            <a:r>
+              <a:rPr lang="en-US" altLang="zh-Hans" sz="900" dirty="0"/>
+              <a:t>1</a:t>
+            </a:r>
+            <a:r>
+              <a:rPr lang="zh-Hans" altLang="en-US" sz="900" dirty="0"/>
+              <a:t> </a:t>
+            </a:r>
+            <a:r>
+              <a:rPr lang="en-US" altLang="zh-Hans" sz="900" dirty="0"/>
+              <a:t>al/milk  c/healthy</a:t>
+            </a:r>
+            <a:r>
+              <a:rPr lang="en-US" sz="1100" dirty="0"/>
+              <a:t>”)</a:t>
+            </a:r>
+          </a:p>
+        </p:txBody>
+      </p:sp>
+      <p:sp>
+        <p:nvSpPr>
+          <p:cNvPr id="104" name="TextBox 103">
+            <a:extLst>
+              <a:ext uri="{FF2B5EF4-FFF2-40B4-BE49-F238E27FC236}">
+                <a16:creationId xmlns:a16="http://schemas.microsoft.com/office/drawing/2014/main" id="{DB8EE965-1CB1-4D34-9A1F-B8C85A013C82}"/>
+              </a:ext>
+            </a:extLst>
+          </p:cNvPr>
           <p:cNvSpPr txBox="1"/>
           <p:nvPr/>
         </p:nvSpPr>
         <p:spPr>
           <a:xfrm>
-            <a:off x="1620659" y="3619497"/>
-            <a:ext cx="220343" cy="138499"/>
+            <a:off x="2654692" y="4906798"/>
+            <a:ext cx="621216" cy="153888"/>
           </a:xfrm>
           <a:prstGeom prst="rect">
             <a:avLst/>
@@ -4929,6 +5081,195 @@
           </a:lstStyle>
           <a:p>
             <a:r>
+              <a:rPr lang="en-US" sz="1000" dirty="0"/>
+              <a:t>result</a:t>
+            </a:r>
+          </a:p>
+        </p:txBody>
+      </p:sp>
+      <p:sp>
+        <p:nvSpPr>
+          <p:cNvPr id="105" name="TextBox 104">
+            <a:extLst>
+              <a:ext uri="{FF2B5EF4-FFF2-40B4-BE49-F238E27FC236}">
+                <a16:creationId xmlns:a16="http://schemas.microsoft.com/office/drawing/2014/main" id="{DDB0E724-9463-4C7A-A251-FD7AB245BC72}"/>
+              </a:ext>
+            </a:extLst>
+          </p:cNvPr>
+          <p:cNvSpPr txBox="1"/>
+          <p:nvPr/>
+        </p:nvSpPr>
+        <p:spPr>
+          <a:xfrm>
+            <a:off x="-87651" y="5065670"/>
+            <a:ext cx="762000" cy="138499"/>
+          </a:xfrm>
+          <a:prstGeom prst="rect">
+            <a:avLst/>
+          </a:prstGeom>
+          <a:noFill/>
+        </p:spPr>
+        <p:txBody>
+          <a:bodyPr wrap="square" lIns="0" tIns="0" rIns="0" bIns="0" rtlCol="0">
+            <a:spAutoFit/>
+          </a:bodyPr>
+          <a:lstStyle>
+            <a:defPPr>
+              <a:defRPr lang="en-US"/>
+            </a:defPPr>
+            <a:lvl1pPr algn="r">
+              <a:defRPr sz="1400">
+                <a:solidFill>
+                  <a:srgbClr val="0070C0"/>
+                </a:solidFill>
+              </a:defRPr>
+            </a:lvl1pPr>
+          </a:lstStyle>
+          <a:p>
+            <a:r>
+              <a:rPr lang="en-US" sz="900" dirty="0"/>
+              <a:t>result</a:t>
+            </a:r>
+          </a:p>
+        </p:txBody>
+      </p:sp>
+      <p:sp>
+        <p:nvSpPr>
+          <p:cNvPr id="106" name="Rectangle 105">
+            <a:extLst>
+              <a:ext uri="{FF2B5EF4-FFF2-40B4-BE49-F238E27FC236}">
+                <a16:creationId xmlns:a16="http://schemas.microsoft.com/office/drawing/2014/main" id="{A853BC73-4771-426C-9F00-38C8DD929D92}"/>
+              </a:ext>
+            </a:extLst>
+          </p:cNvPr>
+          <p:cNvSpPr/>
+          <p:nvPr/>
+        </p:nvSpPr>
+        <p:spPr>
+          <a:xfrm>
+            <a:off x="5948363" y="4956638"/>
+            <a:ext cx="152400" cy="171376"/>
+          </a:xfrm>
+          <a:prstGeom prst="rect">
+            <a:avLst/>
+          </a:prstGeom>
+          <a:solidFill>
+            <a:srgbClr val="0070C0"/>
+          </a:solidFill>
+          <a:ln>
+            <a:solidFill>
+              <a:srgbClr val="0070C0"/>
+            </a:solidFill>
+          </a:ln>
+          <a:effectLst/>
+        </p:spPr>
+        <p:style>
+          <a:lnRef idx="1">
+            <a:schemeClr val="accent3"/>
+          </a:lnRef>
+          <a:fillRef idx="2">
+            <a:schemeClr val="accent3"/>
+          </a:fillRef>
+          <a:effectRef idx="1">
+            <a:schemeClr val="accent3"/>
+          </a:effectRef>
+          <a:fontRef idx="minor">
+            <a:schemeClr val="dk1"/>
+          </a:fontRef>
+        </p:style>
+        <p:txBody>
+          <a:bodyPr rtlCol="0" anchor="ctr"/>
+          <a:lstStyle/>
+          <a:p>
+            <a:pPr algn="ctr"/>
+            <a:endParaRPr lang="en-SG" sz="1400"/>
+          </a:p>
+        </p:txBody>
+      </p:sp>
+      <p:cxnSp>
+        <p:nvCxnSpPr>
+          <p:cNvPr id="107" name="Straight Arrow Connector 106">
+            <a:extLst>
+              <a:ext uri="{FF2B5EF4-FFF2-40B4-BE49-F238E27FC236}">
+                <a16:creationId xmlns:a16="http://schemas.microsoft.com/office/drawing/2014/main" id="{89CE9F59-0338-4259-B198-B53DA2BD2C6A}"/>
+              </a:ext>
+            </a:extLst>
+          </p:cNvPr>
+          <p:cNvCxnSpPr/>
+          <p:nvPr/>
+        </p:nvCxnSpPr>
+        <p:spPr>
+          <a:xfrm>
+            <a:off x="5120737" y="5099949"/>
+            <a:ext cx="966624" cy="0"/>
+          </a:xfrm>
+          <a:prstGeom prst="straightConnector1">
+            <a:avLst/>
+          </a:prstGeom>
+          <a:ln w="19050">
+            <a:solidFill>
+              <a:srgbClr val="0070C0"/>
+            </a:solidFill>
+            <a:prstDash val="sysDash"/>
+            <a:headEnd type="arrow" w="med" len="med"/>
+            <a:tailEnd type="none" w="med" len="med"/>
+          </a:ln>
+        </p:spPr>
+        <p:style>
+          <a:lnRef idx="1">
+            <a:schemeClr val="accent1"/>
+          </a:lnRef>
+          <a:fillRef idx="0">
+            <a:schemeClr val="accent1"/>
+          </a:fillRef>
+          <a:effectRef idx="0">
+            <a:schemeClr val="accent1"/>
+          </a:effectRef>
+          <a:fontRef idx="minor">
+            <a:schemeClr val="tx1"/>
+          </a:fontRef>
+        </p:style>
+      </p:cxnSp>
+      <p:sp>
+        <p:nvSpPr>
+          <p:cNvPr id="108" name="TextBox 107">
+            <a:extLst>
+              <a:ext uri="{FF2B5EF4-FFF2-40B4-BE49-F238E27FC236}">
+                <a16:creationId xmlns:a16="http://schemas.microsoft.com/office/drawing/2014/main" id="{98E6FE92-C62D-472C-8C4C-0A522A67BEA1}"/>
+              </a:ext>
+            </a:extLst>
+          </p:cNvPr>
+          <p:cNvSpPr txBox="1"/>
+          <p:nvPr/>
+        </p:nvSpPr>
+        <p:spPr>
+          <a:xfrm>
+            <a:off x="1620659" y="3619497"/>
+            <a:ext cx="220343" cy="138499"/>
+          </a:xfrm>
+          <a:prstGeom prst="rect">
+            <a:avLst/>
+          </a:prstGeom>
+          <a:noFill/>
+        </p:spPr>
+        <p:txBody>
+          <a:bodyPr wrap="square" lIns="0" tIns="0" rIns="0" bIns="0" rtlCol="0">
+            <a:spAutoFit/>
+          </a:bodyPr>
+          <a:lstStyle>
+            <a:defPPr>
+              <a:defRPr lang="en-US"/>
+            </a:defPPr>
+            <a:lvl1pPr algn="r">
+              <a:defRPr sz="1400">
+                <a:solidFill>
+                  <a:srgbClr val="0070C0"/>
+                </a:solidFill>
+              </a:defRPr>
+            </a:lvl1pPr>
+          </a:lstStyle>
+          <a:p>
+            <a:r>
               <a:rPr lang="en-US" sz="900" dirty="0"/>
               <a:t>d</a:t>
             </a:r>
@@ -4937,14 +5278,20 @@
       </p:sp>
       <p:sp>
         <p:nvSpPr>
-          <p:cNvPr id="40" name="Rectangle 62"/>
+          <p:cNvPr id="109" name="Rectangle 62">
+            <a:extLst>
+              <a:ext uri="{FF2B5EF4-FFF2-40B4-BE49-F238E27FC236}">
+                <a16:creationId xmlns:a16="http://schemas.microsoft.com/office/drawing/2014/main" id="{E21EA6AC-2A58-4E15-80FB-707807C36DE5}"/>
+              </a:ext>
+            </a:extLst>
+          </p:cNvPr>
           <p:cNvSpPr/>
           <p:nvPr/>
         </p:nvSpPr>
         <p:spPr>
           <a:xfrm>
-            <a:off x="3183125" y="2486322"/>
-            <a:ext cx="1378279" cy="406397"/>
+            <a:off x="3183125" y="2356642"/>
+            <a:ext cx="1434651" cy="536077"/>
           </a:xfrm>
           <a:prstGeom prst="rect">
             <a:avLst/>
@@ -4992,7 +5339,7 @@
                   <a:schemeClr val="bg1"/>
                 </a:solidFill>
               </a:rPr>
-              <a:t>FilterPatient</a:t>
+              <a:t>AddMedicalHistory</a:t>
             </a:r>
             <a:endParaRPr lang="en-US" sz="1200" dirty="0">
               <a:solidFill>
@@ -5020,7 +5367,13 @@
       </p:sp>
       <p:cxnSp>
         <p:nvCxnSpPr>
-          <p:cNvPr id="8" name="Straight Arrow Connector 7"/>
+          <p:cNvPr id="110" name="Straight Arrow Connector 109">
+            <a:extLst>
+              <a:ext uri="{FF2B5EF4-FFF2-40B4-BE49-F238E27FC236}">
+                <a16:creationId xmlns:a16="http://schemas.microsoft.com/office/drawing/2014/main" id="{4F40C2F7-BC45-4985-BD82-BDE4737CBDFA}"/>
+              </a:ext>
+            </a:extLst>
+          </p:cNvPr>
           <p:cNvCxnSpPr>
             <a:cxnSpLocks/>
           </p:cNvCxnSpPr>
@@ -5056,7 +5409,13 @@
       </p:cxnSp>
       <p:sp>
         <p:nvSpPr>
-          <p:cNvPr id="45" name="Rectangle 44"/>
+          <p:cNvPr id="111" name="Rectangle 110">
+            <a:extLst>
+              <a:ext uri="{FF2B5EF4-FFF2-40B4-BE49-F238E27FC236}">
+                <a16:creationId xmlns:a16="http://schemas.microsoft.com/office/drawing/2014/main" id="{7A43ED2A-1887-4D66-B8D8-F5DD2D518220}"/>
+              </a:ext>
+            </a:extLst>
+          </p:cNvPr>
           <p:cNvSpPr/>
           <p:nvPr/>
         </p:nvSpPr>
@@ -5103,7 +5462,13 @@
       </p:sp>
       <p:cxnSp>
         <p:nvCxnSpPr>
-          <p:cNvPr id="46" name="Straight Connector 45"/>
+          <p:cNvPr id="112" name="Straight Connector 111">
+            <a:extLst>
+              <a:ext uri="{FF2B5EF4-FFF2-40B4-BE49-F238E27FC236}">
+                <a16:creationId xmlns:a16="http://schemas.microsoft.com/office/drawing/2014/main" id="{974B706A-D23C-400C-B2AA-7C297BA893B6}"/>
+              </a:ext>
+            </a:extLst>
+          </p:cNvPr>
           <p:cNvCxnSpPr>
             <a:cxnSpLocks/>
           </p:cNvCxnSpPr>
@@ -5142,7 +5507,13 @@
       </p:cxnSp>
       <p:sp>
         <p:nvSpPr>
-          <p:cNvPr id="49" name="Rectangle 48"/>
+          <p:cNvPr id="113" name="Rectangle 112">
+            <a:extLst>
+              <a:ext uri="{FF2B5EF4-FFF2-40B4-BE49-F238E27FC236}">
+                <a16:creationId xmlns:a16="http://schemas.microsoft.com/office/drawing/2014/main" id="{89320151-1795-4748-BA78-1AE2ED559BFF}"/>
+              </a:ext>
+            </a:extLst>
+          </p:cNvPr>
           <p:cNvSpPr/>
           <p:nvPr/>
         </p:nvSpPr>
@@ -5189,7 +5560,13 @@
       </p:sp>
       <p:cxnSp>
         <p:nvCxnSpPr>
-          <p:cNvPr id="51" name="Straight Arrow Connector 50"/>
+          <p:cNvPr id="114" name="Straight Arrow Connector 113">
+            <a:extLst>
+              <a:ext uri="{FF2B5EF4-FFF2-40B4-BE49-F238E27FC236}">
+                <a16:creationId xmlns:a16="http://schemas.microsoft.com/office/drawing/2014/main" id="{E156E0BB-FA04-4519-B9D9-39CA89AF633A}"/>
+              </a:ext>
+            </a:extLst>
+          </p:cNvPr>
           <p:cNvCxnSpPr>
             <a:cxnSpLocks/>
           </p:cNvCxnSpPr>
@@ -5229,7 +5606,13 @@
       </p:cxnSp>
       <p:cxnSp>
         <p:nvCxnSpPr>
-          <p:cNvPr id="13" name="Straight Arrow Connector 12"/>
+          <p:cNvPr id="115" name="Straight Arrow Connector 114">
+            <a:extLst>
+              <a:ext uri="{FF2B5EF4-FFF2-40B4-BE49-F238E27FC236}">
+                <a16:creationId xmlns:a16="http://schemas.microsoft.com/office/drawing/2014/main" id="{5547858F-5684-42E8-9F4D-FEF614373C6A}"/>
+              </a:ext>
+            </a:extLst>
+          </p:cNvPr>
           <p:cNvCxnSpPr/>
           <p:nvPr/>
         </p:nvCxnSpPr>
@@ -5263,7 +5646,13 @@
       </p:cxnSp>
       <p:cxnSp>
         <p:nvCxnSpPr>
-          <p:cNvPr id="50" name="Straight Arrow Connector 49"/>
+          <p:cNvPr id="116" name="Straight Arrow Connector 115">
+            <a:extLst>
+              <a:ext uri="{FF2B5EF4-FFF2-40B4-BE49-F238E27FC236}">
+                <a16:creationId xmlns:a16="http://schemas.microsoft.com/office/drawing/2014/main" id="{3133F97D-31FA-4C85-990C-97DAE330F221}"/>
+              </a:ext>
+            </a:extLst>
+          </p:cNvPr>
           <p:cNvCxnSpPr>
             <a:cxnSpLocks/>
           </p:cNvCxnSpPr>
@@ -5301,7 +5690,13 @@
       </p:cxnSp>
       <p:cxnSp>
         <p:nvCxnSpPr>
-          <p:cNvPr id="52" name="Straight Arrow Connector 51"/>
+          <p:cNvPr id="117" name="Straight Arrow Connector 116">
+            <a:extLst>
+              <a:ext uri="{FF2B5EF4-FFF2-40B4-BE49-F238E27FC236}">
+                <a16:creationId xmlns:a16="http://schemas.microsoft.com/office/drawing/2014/main" id="{B09D494E-80A3-4028-9F52-FFF78FCD1EB3}"/>
+              </a:ext>
+            </a:extLst>
+          </p:cNvPr>
           <p:cNvCxnSpPr>
             <a:cxnSpLocks/>
           </p:cNvCxnSpPr>
@@ -5341,7 +5736,13 @@
       </p:cxnSp>
       <p:sp>
         <p:nvSpPr>
-          <p:cNvPr id="4" name="TextBox 3"/>
+          <p:cNvPr id="118" name="TextBox 117">
+            <a:extLst>
+              <a:ext uri="{FF2B5EF4-FFF2-40B4-BE49-F238E27FC236}">
+                <a16:creationId xmlns:a16="http://schemas.microsoft.com/office/drawing/2014/main" id="{45BB1DB7-64B6-4463-8F74-2DB92E74B55E}"/>
+              </a:ext>
+            </a:extLst>
+          </p:cNvPr>
           <p:cNvSpPr txBox="1"/>
           <p:nvPr/>
         </p:nvSpPr>
@@ -5374,10 +5775,10 @@
       </p:sp>
       <p:cxnSp>
         <p:nvCxnSpPr>
-          <p:cNvPr id="74" name="Straight Connector 70">
+          <p:cNvPr id="119" name="Straight Connector 70">
             <a:extLst>
               <a:ext uri="{FF2B5EF4-FFF2-40B4-BE49-F238E27FC236}">
-                <a16:creationId xmlns:a16="http://schemas.microsoft.com/office/drawing/2014/main" id="{3C5E4B8D-C49A-FF4C-B2DF-24E2514AB45D}"/>
+                <a16:creationId xmlns:a16="http://schemas.microsoft.com/office/drawing/2014/main" id="{50609CDA-42FD-48D2-8E95-2624032B755E}"/>
               </a:ext>
             </a:extLst>
           </p:cNvPr>
@@ -5422,10 +5823,10 @@
       </p:cxnSp>
       <p:sp>
         <p:nvSpPr>
-          <p:cNvPr id="85" name="Rectangle 72">
+          <p:cNvPr id="120" name="Rectangle 72">
             <a:extLst>
               <a:ext uri="{FF2B5EF4-FFF2-40B4-BE49-F238E27FC236}">
-                <a16:creationId xmlns:a16="http://schemas.microsoft.com/office/drawing/2014/main" id="{3A77499D-19EC-794E-A5C5-26EFCB5ED155}"/>
+                <a16:creationId xmlns:a16="http://schemas.microsoft.com/office/drawing/2014/main" id="{1E3A9B11-E258-4C6F-8FB8-3DA5C1A1E3D9}"/>
               </a:ext>
             </a:extLst>
           </p:cNvPr>
@@ -5485,16 +5886,16 @@
       </p:sp>
       <p:cxnSp>
         <p:nvCxnSpPr>
-          <p:cNvPr id="87" name="Straight Arrow Connector 75">
+          <p:cNvPr id="121" name="Straight Arrow Connector 75">
             <a:extLst>
               <a:ext uri="{FF2B5EF4-FFF2-40B4-BE49-F238E27FC236}">
-                <a16:creationId xmlns:a16="http://schemas.microsoft.com/office/drawing/2014/main" id="{7CF7ECA5-86DB-CF42-9365-87754163FDB3}"/>
+                <a16:creationId xmlns:a16="http://schemas.microsoft.com/office/drawing/2014/main" id="{ED78A591-435C-4224-8C8F-EBB5E6BFEF58}"/>
               </a:ext>
             </a:extLst>
           </p:cNvPr>
           <p:cNvCxnSpPr>
             <a:cxnSpLocks/>
-            <a:endCxn id="85" idx="2"/>
+            <a:endCxn id="120" idx="2"/>
           </p:cNvCxnSpPr>
           <p:nvPr/>
         </p:nvCxnSpPr>
@@ -5535,10 +5936,10 @@
       </p:cxnSp>
       <p:sp>
         <p:nvSpPr>
-          <p:cNvPr id="88" name="Rectangle 62">
+          <p:cNvPr id="122" name="Rectangle 62">
             <a:extLst>
               <a:ext uri="{FF2B5EF4-FFF2-40B4-BE49-F238E27FC236}">
-                <a16:creationId xmlns:a16="http://schemas.microsoft.com/office/drawing/2014/main" id="{F7BA9BAF-B03F-A340-B807-FCD99F49A49E}"/>
+                <a16:creationId xmlns:a16="http://schemas.microsoft.com/office/drawing/2014/main" id="{519CD46A-B1DB-408C-A2E8-2039CB5099DF}"/>
               </a:ext>
             </a:extLst>
           </p:cNvPr>
@@ -5606,10 +6007,10 @@
       </p:sp>
       <p:sp>
         <p:nvSpPr>
-          <p:cNvPr id="89" name="TextBox 77">
+          <p:cNvPr id="123" name="TextBox 77">
             <a:extLst>
               <a:ext uri="{FF2B5EF4-FFF2-40B4-BE49-F238E27FC236}">
-                <a16:creationId xmlns:a16="http://schemas.microsoft.com/office/drawing/2014/main" id="{093278BE-0289-F347-B6D7-0B94514EC160}"/>
+                <a16:creationId xmlns:a16="http://schemas.microsoft.com/office/drawing/2014/main" id="{BC9995F3-C989-4985-BAE1-145BA7FBDE28}"/>
               </a:ext>
             </a:extLst>
           </p:cNvPr>
@@ -5618,7 +6019,7 @@
         </p:nvSpPr>
         <p:spPr>
           <a:xfrm rot="10800000" flipV="1">
-            <a:off x="5243464" y="4017067"/>
+            <a:off x="5235760" y="4183944"/>
             <a:ext cx="540859" cy="153888"/>
           </a:xfrm>
           <a:prstGeom prst="rect">
@@ -5649,17 +6050,17 @@
                   <a:srgbClr val="7030A0"/>
                 </a:solidFill>
               </a:rPr>
-              <a:t>p</a:t>
+              <a:t>q</a:t>
             </a:r>
           </a:p>
         </p:txBody>
       </p:sp>
       <p:cxnSp>
         <p:nvCxnSpPr>
-          <p:cNvPr id="91" name="Straight Arrow Connector 74">
+          <p:cNvPr id="124" name="Straight Arrow Connector 74">
             <a:extLst>
               <a:ext uri="{FF2B5EF4-FFF2-40B4-BE49-F238E27FC236}">
-                <a16:creationId xmlns:a16="http://schemas.microsoft.com/office/drawing/2014/main" id="{C03ABABB-0272-4C4A-9E08-568D3C87CA72}"/>
+                <a16:creationId xmlns:a16="http://schemas.microsoft.com/office/drawing/2014/main" id="{1B8821BB-6E0A-4409-A653-831E5DBF68EF}"/>
               </a:ext>
             </a:extLst>
           </p:cNvPr>
@@ -5700,13 +6101,19 @@
       </p:cxnSp>
       <p:sp>
         <p:nvSpPr>
-          <p:cNvPr id="78" name="TextBox 77"/>
+          <p:cNvPr id="125" name="TextBox 124">
+            <a:extLst>
+              <a:ext uri="{FF2B5EF4-FFF2-40B4-BE49-F238E27FC236}">
+                <a16:creationId xmlns:a16="http://schemas.microsoft.com/office/drawing/2014/main" id="{2C2D9080-61D8-4398-BD3A-9D83D0C9DC32}"/>
+              </a:ext>
+            </a:extLst>
+          </p:cNvPr>
           <p:cNvSpPr txBox="1"/>
           <p:nvPr/>
         </p:nvSpPr>
         <p:spPr>
           <a:xfrm>
-            <a:off x="5305119" y="4339030"/>
+            <a:off x="5060096" y="4339566"/>
             <a:ext cx="1424846" cy="138499"/>
           </a:xfrm>
           <a:prstGeom prst="rect">
@@ -5737,7 +6144,7 @@
                   <a:srgbClr val="7030A0"/>
                 </a:solidFill>
               </a:rPr>
-              <a:t>updateFilteredPersonList</a:t>
+              <a:t>updatePerson</a:t>
             </a:r>
             <a:r>
               <a:rPr lang="en-US" sz="900" dirty="0">
@@ -5752,7 +6159,13 @@
       </p:sp>
       <p:sp>
         <p:nvSpPr>
-          <p:cNvPr id="84" name="Rectangle 62"/>
+          <p:cNvPr id="126" name="Rectangle 62">
+            <a:extLst>
+              <a:ext uri="{FF2B5EF4-FFF2-40B4-BE49-F238E27FC236}">
+                <a16:creationId xmlns:a16="http://schemas.microsoft.com/office/drawing/2014/main" id="{2543EDEB-5E9E-4E66-81CF-8DAEC823748B}"/>
+              </a:ext>
+            </a:extLst>
+          </p:cNvPr>
           <p:cNvSpPr/>
           <p:nvPr/>
         </p:nvSpPr>

</xml_diff>